<commit_message>
udpated document with PCTmax for sup pumping
</commit_message>
<xml_diff>
--- a/Examples/AgWaterUse/doc/Options.pptx
+++ b/Examples/AgWaterUse/doc/Options.pptx
@@ -4244,8 +4244,8 @@
         </p:nvSpPr>
         <p:spPr>
           <a:xfrm>
-            <a:off x="207676" y="144455"/>
-            <a:ext cx="2735317" cy="892552"/>
+            <a:off x="323540" y="377055"/>
+            <a:ext cx="2487790" cy="523220"/>
           </a:xfrm>
           <a:prstGeom prst="rect">
             <a:avLst/>
@@ -4261,30 +4261,9 @@
             <a:pPr algn="ctr"/>
             <a:r>
               <a:rPr lang="en-US" sz="1400" dirty="0"/>
-              <a:t>SW diversion</a:t>
-            </a:r>
-          </a:p>
-          <a:p>
-            <a:pPr algn="ctr"/>
-            <a:r>
-              <a:rPr lang="en-US" sz="1400" dirty="0"/>
-              <a:t>Demand set using SFR2 (</a:t>
-            </a:r>
-            <a:r>
-              <a:rPr lang="en-US" sz="1400" dirty="0" err="1"/>
-              <a:t>Tabfiles</a:t>
-            </a:r>
-            <a:r>
-              <a:rPr lang="en-US" sz="1400" dirty="0"/>
-              <a:t>) input variable “FLOW”</a:t>
-            </a:r>
-          </a:p>
-          <a:p>
-            <a:pPr algn="ctr"/>
-            <a:r>
-              <a:rPr lang="en-US" sz="1000" dirty="0"/>
-              <a:t>(IRRIGATIONSEGMENT)</a:t>
-            </a:r>
+              <a:t>NIWR set using specified diversions in SFR input</a:t>
+            </a:r>
+            <a:endParaRPr lang="en-US" sz="1000" dirty="0"/>
           </a:p>
         </p:txBody>
       </p:sp>
@@ -4437,7 +4416,7 @@
         <p:spPr>
           <a:xfrm>
             <a:off x="3673179" y="3233148"/>
-            <a:ext cx="1723696" cy="738664"/>
+            <a:ext cx="1723696" cy="523220"/>
           </a:xfrm>
           <a:prstGeom prst="rect">
             <a:avLst/>
@@ -4463,12 +4442,6 @@
               <a:t> calculated by UZF/PRMS</a:t>
             </a:r>
           </a:p>
-          <a:p>
-            <a:r>
-              <a:rPr lang="en-US" sz="1400" dirty="0"/>
-              <a:t>(IUZFBND&gt;0)</a:t>
-            </a:r>
-          </a:p>
         </p:txBody>
       </p:sp>
       <p:sp>
@@ -4480,7 +4453,7 @@
         <p:spPr>
           <a:xfrm>
             <a:off x="577209" y="3229173"/>
-            <a:ext cx="1666057" cy="954107"/>
+            <a:ext cx="1666057" cy="738664"/>
           </a:xfrm>
           <a:prstGeom prst="rect">
             <a:avLst/>
@@ -4504,12 +4477,6 @@
             <a:r>
               <a:rPr lang="en-US" sz="1400" dirty="0"/>
               <a:t> calculated in AGO using efficiency factor</a:t>
-            </a:r>
-          </a:p>
-          <a:p>
-            <a:r>
-              <a:rPr lang="en-US" sz="1400" dirty="0"/>
-              <a:t>(IUZFBND&lt;0)</a:t>
             </a:r>
           </a:p>
         </p:txBody>
@@ -4817,9 +4784,9 @@
         <p:grpSpPr>
           <a:xfrm>
             <a:off x="2721930" y="424325"/>
-            <a:ext cx="2735317" cy="590705"/>
+            <a:ext cx="2593537" cy="590705"/>
             <a:chOff x="3017617" y="694857"/>
-            <a:chExt cx="2735317" cy="590705"/>
+            <a:chExt cx="2593537" cy="590705"/>
           </a:xfrm>
         </p:grpSpPr>
         <p:sp>
@@ -4877,7 +4844,7 @@
           <p:spPr>
             <a:xfrm>
               <a:off x="3017617" y="762342"/>
-              <a:ext cx="2735317" cy="523220"/>
+              <a:ext cx="2593537" cy="523220"/>
             </a:xfrm>
             <a:prstGeom prst="rect">
               <a:avLst/>
@@ -4893,8 +4860,9 @@
               <a:pPr algn="ctr"/>
               <a:r>
                 <a:rPr lang="en-US" sz="1400" dirty="0"/>
-                <a:t>Demand set using AGO input variable “Q”</a:t>
+                <a:t>NIWR set using specified pumping rates in AG input</a:t>
               </a:r>
+              <a:endParaRPr lang="en-US" sz="1000" dirty="0"/>
             </a:p>
           </p:txBody>
         </p:sp>

</xml_diff>

<commit_message>
work on Ag doc
</commit_message>
<xml_diff>
--- a/Examples/AgWaterUse/doc/Options.pptx
+++ b/Examples/AgWaterUse/doc/Options.pptx
@@ -9,6 +9,7 @@
     <p:sldId id="259" r:id="rId3"/>
     <p:sldId id="257" r:id="rId4"/>
     <p:sldId id="258" r:id="rId5"/>
+    <p:sldId id="260" r:id="rId6"/>
   </p:sldIdLst>
   <p:sldSz cx="12192000" cy="6858000"/>
   <p:notesSz cx="6858000" cy="9144000"/>
@@ -244,7 +245,7 @@
           <a:p>
             <a:fld id="{652F1E81-1D68-4626-9ECC-923EDADFDCD3}" type="datetimeFigureOut">
               <a:rPr lang="en-US" smtClean="0"/>
-              <a:t>12/19/2018</a:t>
+              <a:t>2/5/2019</a:t>
             </a:fld>
             <a:endParaRPr lang="en-US"/>
           </a:p>
@@ -412,7 +413,7 @@
           <a:p>
             <a:fld id="{652F1E81-1D68-4626-9ECC-923EDADFDCD3}" type="datetimeFigureOut">
               <a:rPr lang="en-US" smtClean="0"/>
-              <a:t>12/19/2018</a:t>
+              <a:t>2/5/2019</a:t>
             </a:fld>
             <a:endParaRPr lang="en-US"/>
           </a:p>
@@ -590,7 +591,7 @@
           <a:p>
             <a:fld id="{652F1E81-1D68-4626-9ECC-923EDADFDCD3}" type="datetimeFigureOut">
               <a:rPr lang="en-US" smtClean="0"/>
-              <a:t>12/19/2018</a:t>
+              <a:t>2/5/2019</a:t>
             </a:fld>
             <a:endParaRPr lang="en-US"/>
           </a:p>
@@ -758,7 +759,7 @@
           <a:p>
             <a:fld id="{652F1E81-1D68-4626-9ECC-923EDADFDCD3}" type="datetimeFigureOut">
               <a:rPr lang="en-US" smtClean="0"/>
-              <a:t>12/19/2018</a:t>
+              <a:t>2/5/2019</a:t>
             </a:fld>
             <a:endParaRPr lang="en-US"/>
           </a:p>
@@ -1003,7 +1004,7 @@
           <a:p>
             <a:fld id="{652F1E81-1D68-4626-9ECC-923EDADFDCD3}" type="datetimeFigureOut">
               <a:rPr lang="en-US" smtClean="0"/>
-              <a:t>12/19/2018</a:t>
+              <a:t>2/5/2019</a:t>
             </a:fld>
             <a:endParaRPr lang="en-US"/>
           </a:p>
@@ -1232,7 +1233,7 @@
           <a:p>
             <a:fld id="{652F1E81-1D68-4626-9ECC-923EDADFDCD3}" type="datetimeFigureOut">
               <a:rPr lang="en-US" smtClean="0"/>
-              <a:t>12/19/2018</a:t>
+              <a:t>2/5/2019</a:t>
             </a:fld>
             <a:endParaRPr lang="en-US"/>
           </a:p>
@@ -1596,7 +1597,7 @@
           <a:p>
             <a:fld id="{652F1E81-1D68-4626-9ECC-923EDADFDCD3}" type="datetimeFigureOut">
               <a:rPr lang="en-US" smtClean="0"/>
-              <a:t>12/19/2018</a:t>
+              <a:t>2/5/2019</a:t>
             </a:fld>
             <a:endParaRPr lang="en-US"/>
           </a:p>
@@ -1713,7 +1714,7 @@
           <a:p>
             <a:fld id="{652F1E81-1D68-4626-9ECC-923EDADFDCD3}" type="datetimeFigureOut">
               <a:rPr lang="en-US" smtClean="0"/>
-              <a:t>12/19/2018</a:t>
+              <a:t>2/5/2019</a:t>
             </a:fld>
             <a:endParaRPr lang="en-US"/>
           </a:p>
@@ -1808,7 +1809,7 @@
           <a:p>
             <a:fld id="{652F1E81-1D68-4626-9ECC-923EDADFDCD3}" type="datetimeFigureOut">
               <a:rPr lang="en-US" smtClean="0"/>
-              <a:t>12/19/2018</a:t>
+              <a:t>2/5/2019</a:t>
             </a:fld>
             <a:endParaRPr lang="en-US"/>
           </a:p>
@@ -2083,7 +2084,7 @@
           <a:p>
             <a:fld id="{652F1E81-1D68-4626-9ECC-923EDADFDCD3}" type="datetimeFigureOut">
               <a:rPr lang="en-US" smtClean="0"/>
-              <a:t>12/19/2018</a:t>
+              <a:t>2/5/2019</a:t>
             </a:fld>
             <a:endParaRPr lang="en-US"/>
           </a:p>
@@ -2335,7 +2336,7 @@
           <a:p>
             <a:fld id="{652F1E81-1D68-4626-9ECC-923EDADFDCD3}" type="datetimeFigureOut">
               <a:rPr lang="en-US" smtClean="0"/>
-              <a:t>12/19/2018</a:t>
+              <a:t>2/5/2019</a:t>
             </a:fld>
             <a:endParaRPr lang="en-US"/>
           </a:p>
@@ -2546,7 +2547,7 @@
           <a:p>
             <a:fld id="{652F1E81-1D68-4626-9ECC-923EDADFDCD3}" type="datetimeFigureOut">
               <a:rPr lang="en-US" smtClean="0"/>
-              <a:t>12/19/2018</a:t>
+              <a:t>2/5/2019</a:t>
             </a:fld>
             <a:endParaRPr lang="en-US"/>
           </a:p>
@@ -2986,14 +2987,14 @@
           </a:ln>
           <a:extLst>
             <a:ext uri="{909E8E84-426E-40dd-AFC4-6F175D3DCCD1}">
-              <a14:hiddenFill xmlns:a14="http://schemas.microsoft.com/office/drawing/2010/main" xmlns="">
+              <a14:hiddenFill xmlns="" xmlns:a14="http://schemas.microsoft.com/office/drawing/2010/main">
                 <a:solidFill>
                   <a:schemeClr val="accent1"/>
                 </a:solidFill>
               </a14:hiddenFill>
             </a:ext>
             <a:ext uri="{91240B29-F687-4f45-9708-019B960494DF}">
-              <a14:hiddenLine xmlns:a14="http://schemas.microsoft.com/office/drawing/2010/main" xmlns="" w="9525">
+              <a14:hiddenLine xmlns="" xmlns:a14="http://schemas.microsoft.com/office/drawing/2010/main" w="9525">
                 <a:solidFill>
                   <a:schemeClr val="tx1"/>
                 </a:solidFill>
@@ -3069,14 +3070,14 @@
           </a:ln>
           <a:extLst>
             <a:ext uri="{909E8E84-426E-40dd-AFC4-6F175D3DCCD1}">
-              <a14:hiddenFill xmlns:a14="http://schemas.microsoft.com/office/drawing/2010/main" xmlns="">
+              <a14:hiddenFill xmlns="" xmlns:a14="http://schemas.microsoft.com/office/drawing/2010/main">
                 <a:solidFill>
                   <a:schemeClr val="accent1"/>
                 </a:solidFill>
               </a14:hiddenFill>
             </a:ext>
             <a:ext uri="{91240B29-F687-4f45-9708-019B960494DF}">
-              <a14:hiddenLine xmlns:a14="http://schemas.microsoft.com/office/drawing/2010/main" xmlns="" w="9525">
+              <a14:hiddenLine xmlns="" xmlns:a14="http://schemas.microsoft.com/office/drawing/2010/main" w="9525">
                 <a:solidFill>
                   <a:schemeClr val="tx1"/>
                 </a:solidFill>
@@ -3188,14 +3189,14 @@
           </a:ln>
           <a:extLst>
             <a:ext uri="{909E8E84-426E-40dd-AFC4-6F175D3DCCD1}">
-              <a14:hiddenFill xmlns:a14="http://schemas.microsoft.com/office/drawing/2010/main" xmlns="">
+              <a14:hiddenFill xmlns="" xmlns:a14="http://schemas.microsoft.com/office/drawing/2010/main">
                 <a:solidFill>
                   <a:schemeClr val="accent1"/>
                 </a:solidFill>
               </a14:hiddenFill>
             </a:ext>
             <a:ext uri="{91240B29-F687-4f45-9708-019B960494DF}">
-              <a14:hiddenLine xmlns:a14="http://schemas.microsoft.com/office/drawing/2010/main" xmlns="" w="9525">
+              <a14:hiddenLine xmlns="" xmlns:a14="http://schemas.microsoft.com/office/drawing/2010/main" w="9525">
                 <a:solidFill>
                   <a:schemeClr val="tx1"/>
                 </a:solidFill>
@@ -3513,8 +3514,8 @@
         </p:nvSpPr>
         <p:spPr>
           <a:xfrm>
-            <a:off x="1639614" y="1086742"/>
-            <a:ext cx="2286000" cy="994306"/>
+            <a:off x="1688841" y="732178"/>
+            <a:ext cx="1632857" cy="662520"/>
           </a:xfrm>
           <a:prstGeom prst="rect">
             <a:avLst/>
@@ -3559,8 +3560,8 @@
         </p:nvSpPr>
         <p:spPr>
           <a:xfrm>
-            <a:off x="1643372" y="1127363"/>
-            <a:ext cx="2286001" cy="1015663"/>
+            <a:off x="1354123" y="772799"/>
+            <a:ext cx="2286001" cy="677108"/>
           </a:xfrm>
           <a:prstGeom prst="rect">
             <a:avLst/>
@@ -3575,17 +3576,9 @@
           <a:p>
             <a:pPr algn="ctr"/>
             <a:r>
-              <a:rPr lang="en-US" dirty="0"/>
-              <a:t>SW diversion</a:t>
-            </a:r>
-          </a:p>
-          <a:p>
-            <a:pPr algn="ctr"/>
-            <a:r>
-              <a:rPr lang="en-US" sz="1400" dirty="0"/>
+              <a:rPr lang="en-US" sz="1200" dirty="0"/>
               <a:t>NIWR set using specified diversions in SFR input</a:t>
             </a:r>
-            <a:endParaRPr lang="en-US" sz="1000" dirty="0"/>
           </a:p>
           <a:p>
             <a:pPr algn="ctr"/>
@@ -3601,8 +3594,8 @@
         </p:nvSpPr>
         <p:spPr>
           <a:xfrm>
-            <a:off x="953813" y="266967"/>
-            <a:ext cx="3851452" cy="646331"/>
+            <a:off x="449960" y="175264"/>
+            <a:ext cx="3851452" cy="461665"/>
           </a:xfrm>
           <a:prstGeom prst="rect">
             <a:avLst/>
@@ -3616,7 +3609,7 @@
           <a:lstStyle/>
           <a:p>
             <a:r>
-              <a:rPr lang="en-US" dirty="0"/>
+              <a:rPr lang="en-US" sz="1200" dirty="0"/>
               <a:t>A) Surface water (SW) irrigation using IRRIGATION_DIVERSION Option</a:t>
             </a:r>
           </a:p>
@@ -3625,12 +3618,14 @@
       <p:cxnSp>
         <p:nvCxnSpPr>
           <p:cNvPr id="8" name="Straight Arrow Connector 7"/>
-          <p:cNvCxnSpPr/>
+          <p:cNvCxnSpPr>
+            <a:cxnSpLocks/>
+          </p:cNvCxnSpPr>
           <p:nvPr/>
         </p:nvCxnSpPr>
         <p:spPr>
           <a:xfrm>
-            <a:off x="2806263" y="2081048"/>
+            <a:off x="2522081" y="1390526"/>
             <a:ext cx="0" cy="225385"/>
           </a:xfrm>
           <a:prstGeom prst="straightConnector1">
@@ -3667,7 +3662,7 @@
         </p:nvCxnSpPr>
         <p:spPr>
           <a:xfrm>
-            <a:off x="2811330" y="2301762"/>
+            <a:off x="2522081" y="1592640"/>
             <a:ext cx="655869" cy="655574"/>
           </a:xfrm>
           <a:prstGeom prst="line">
@@ -3704,7 +3699,7 @@
         </p:nvCxnSpPr>
         <p:spPr>
           <a:xfrm flipV="1">
-            <a:off x="2130805" y="2304978"/>
+            <a:off x="1841556" y="1595856"/>
             <a:ext cx="680526" cy="667049"/>
           </a:xfrm>
           <a:prstGeom prst="line">
@@ -3741,8 +3736,8 @@
         </p:nvSpPr>
         <p:spPr>
           <a:xfrm>
-            <a:off x="3483549" y="3221583"/>
-            <a:ext cx="1723696" cy="738664"/>
+            <a:off x="2894134" y="2286274"/>
+            <a:ext cx="1723696" cy="646331"/>
           </a:xfrm>
           <a:prstGeom prst="rect">
             <a:avLst/>
@@ -3756,15 +3751,15 @@
           <a:lstStyle/>
           <a:p>
             <a:r>
-              <a:rPr lang="en-US" sz="1400" dirty="0" err="1"/>
+              <a:rPr lang="en-US" sz="1200" dirty="0" err="1"/>
               <a:t>ET</a:t>
             </a:r>
             <a:r>
-              <a:rPr lang="en-US" sz="1400" baseline="-25000" dirty="0" err="1"/>
+              <a:rPr lang="en-US" sz="1200" baseline="-25000" dirty="0" err="1"/>
               <a:t>a</a:t>
             </a:r>
             <a:r>
-              <a:rPr lang="en-US" sz="1400" dirty="0"/>
+              <a:rPr lang="en-US" sz="1200" dirty="0"/>
               <a:t> calculated by UZF/PRMS using soil-water balance</a:t>
             </a:r>
           </a:p>
@@ -3778,8 +3773,8 @@
         </p:nvSpPr>
         <p:spPr>
           <a:xfrm>
-            <a:off x="550207" y="3116498"/>
-            <a:ext cx="1666057" cy="738664"/>
+            <a:off x="594091" y="2361585"/>
+            <a:ext cx="1666057" cy="461665"/>
           </a:xfrm>
           <a:prstGeom prst="rect">
             <a:avLst/>
@@ -3793,15 +3788,15 @@
           <a:lstStyle/>
           <a:p>
             <a:r>
-              <a:rPr lang="en-US" sz="1400" dirty="0" err="1"/>
+              <a:rPr lang="en-US" sz="1200" dirty="0" err="1"/>
               <a:t>ET</a:t>
             </a:r>
             <a:r>
-              <a:rPr lang="en-US" sz="1400" baseline="-25000" dirty="0" err="1"/>
+              <a:rPr lang="en-US" sz="1200" baseline="-25000" dirty="0" err="1"/>
               <a:t>a</a:t>
             </a:r>
             <a:r>
-              <a:rPr lang="en-US" sz="1400" dirty="0"/>
+              <a:rPr lang="en-US" sz="1200" dirty="0"/>
               <a:t> calculated in AG using efficiency factor</a:t>
             </a:r>
           </a:p>
@@ -3815,8 +3810,8 @@
         </p:nvSpPr>
         <p:spPr>
           <a:xfrm>
-            <a:off x="407109" y="2957336"/>
-            <a:ext cx="1723696" cy="1215020"/>
+            <a:off x="536453" y="2267315"/>
+            <a:ext cx="1570981" cy="655574"/>
           </a:xfrm>
           <a:prstGeom prst="rect">
             <a:avLst/>
@@ -3861,8 +3856,8 @@
         </p:nvSpPr>
         <p:spPr>
           <a:xfrm>
-            <a:off x="1593916" y="5225425"/>
-            <a:ext cx="2488999" cy="523220"/>
+            <a:off x="1341991" y="4003107"/>
+            <a:ext cx="2488999" cy="461665"/>
           </a:xfrm>
           <a:prstGeom prst="rect">
             <a:avLst/>
@@ -3877,7 +3872,7 @@
           <a:p>
             <a:pPr algn="ctr"/>
             <a:r>
-              <a:rPr lang="en-US" sz="1400" dirty="0"/>
+              <a:rPr lang="en-US" sz="1200" dirty="0"/>
               <a:t>Return flows (SW+GW) calculated by UZF/PRMS</a:t>
             </a:r>
           </a:p>
@@ -3891,8 +3886,8 @@
         </p:nvSpPr>
         <p:spPr>
           <a:xfrm>
-            <a:off x="3467199" y="2957336"/>
-            <a:ext cx="1723696" cy="1215020"/>
+            <a:off x="2877784" y="2250735"/>
+            <a:ext cx="1524679" cy="681870"/>
           </a:xfrm>
           <a:prstGeom prst="rect">
             <a:avLst/>
@@ -3937,8 +3932,8 @@
         </p:nvSpPr>
         <p:spPr>
           <a:xfrm>
-            <a:off x="2458652" y="4080681"/>
-            <a:ext cx="680699" cy="523220"/>
+            <a:off x="2244109" y="2858363"/>
+            <a:ext cx="605935" cy="461665"/>
           </a:xfrm>
           <a:prstGeom prst="rect">
             <a:avLst/>
@@ -3953,14 +3948,14 @@
           <a:p>
             <a:pPr algn="ctr"/>
             <a:r>
-              <a:rPr lang="en-US" sz="1400" dirty="0"/>
+              <a:rPr lang="en-US" sz="1200" dirty="0"/>
               <a:t>Return</a:t>
             </a:r>
           </a:p>
           <a:p>
             <a:pPr algn="ctr"/>
             <a:r>
-              <a:rPr lang="en-US" sz="1400" dirty="0"/>
+              <a:rPr lang="en-US" sz="1200" dirty="0"/>
               <a:t>flows</a:t>
             </a:r>
           </a:p>
@@ -3974,7 +3969,7 @@
         </p:nvCxnSpPr>
         <p:spPr>
           <a:xfrm>
-            <a:off x="2130804" y="4163516"/>
+            <a:off x="1878879" y="2941198"/>
             <a:ext cx="655869" cy="655574"/>
           </a:xfrm>
           <a:prstGeom prst="line">
@@ -4011,7 +4006,7 @@
         </p:nvCxnSpPr>
         <p:spPr>
           <a:xfrm flipV="1">
-            <a:off x="2784025" y="4152041"/>
+            <a:off x="2532100" y="2929723"/>
             <a:ext cx="680526" cy="667049"/>
           </a:xfrm>
           <a:prstGeom prst="line">
@@ -4048,7 +4043,7 @@
         </p:nvCxnSpPr>
         <p:spPr>
           <a:xfrm flipH="1">
-            <a:off x="2783834" y="4824598"/>
+            <a:off x="2531909" y="3602280"/>
             <a:ext cx="3" cy="225385"/>
           </a:xfrm>
           <a:prstGeom prst="straightConnector1">
@@ -4085,8 +4080,8 @@
         </p:nvSpPr>
         <p:spPr>
           <a:xfrm>
-            <a:off x="1383236" y="5055490"/>
-            <a:ext cx="2801196" cy="955089"/>
+            <a:off x="1427587" y="3833173"/>
+            <a:ext cx="2332649" cy="638116"/>
           </a:xfrm>
           <a:prstGeom prst="rect">
             <a:avLst/>
@@ -4131,8 +4126,8 @@
         </p:nvSpPr>
         <p:spPr>
           <a:xfrm>
-            <a:off x="2384606" y="2638219"/>
-            <a:ext cx="907620" cy="523220"/>
+            <a:off x="2104005" y="1826372"/>
+            <a:ext cx="802527" cy="461665"/>
           </a:xfrm>
           <a:prstGeom prst="rect">
             <a:avLst/>
@@ -4147,14 +4142,14 @@
           <a:p>
             <a:pPr algn="ctr"/>
             <a:r>
-              <a:rPr lang="en-US" sz="1400" dirty="0"/>
+              <a:rPr lang="en-US" sz="1200" dirty="0"/>
               <a:t>Diversion </a:t>
             </a:r>
           </a:p>
           <a:p>
             <a:pPr algn="ctr"/>
             <a:r>
-              <a:rPr lang="en-US" sz="1400" dirty="0"/>
+              <a:rPr lang="en-US" sz="1200" dirty="0"/>
               <a:t>flows</a:t>
             </a:r>
           </a:p>
@@ -4198,8 +4193,8 @@
         </p:nvSpPr>
         <p:spPr>
           <a:xfrm>
-            <a:off x="315310" y="109673"/>
-            <a:ext cx="2506700" cy="1160236"/>
+            <a:off x="3184785" y="938713"/>
+            <a:ext cx="2237876" cy="453729"/>
           </a:xfrm>
           <a:prstGeom prst="rect">
             <a:avLst/>
@@ -4244,8 +4239,8 @@
         </p:nvSpPr>
         <p:spPr>
           <a:xfrm>
-            <a:off x="323540" y="377055"/>
-            <a:ext cx="2487790" cy="523220"/>
+            <a:off x="3057409" y="927561"/>
+            <a:ext cx="2487790" cy="461665"/>
           </a:xfrm>
           <a:prstGeom prst="rect">
             <a:avLst/>
@@ -4260,10 +4255,9 @@
           <a:p>
             <a:pPr algn="ctr"/>
             <a:r>
-              <a:rPr lang="en-US" sz="1400" dirty="0"/>
+              <a:rPr lang="en-US" sz="1200" dirty="0"/>
               <a:t>NIWR set using specified diversions in SFR input</a:t>
             </a:r>
-            <a:endParaRPr lang="en-US" sz="1000" dirty="0"/>
           </a:p>
         </p:txBody>
       </p:sp>
@@ -4275,8 +4269,8 @@
         </p:nvSpPr>
         <p:spPr>
           <a:xfrm>
-            <a:off x="6293157" y="276302"/>
-            <a:ext cx="4572001" cy="923330"/>
+            <a:off x="2964001" y="330462"/>
+            <a:ext cx="4572001" cy="461665"/>
           </a:xfrm>
           <a:prstGeom prst="rect">
             <a:avLst/>
@@ -4290,7 +4284,7 @@
           <a:lstStyle/>
           <a:p>
             <a:r>
-              <a:rPr lang="en-US" dirty="0"/>
+              <a:rPr lang="en-US" sz="1200" dirty="0"/>
               <a:t>B) Surface water (SW) and groundwater (GW) irrigation using IRRIGATION_DIVERSION and IRRIGATION_WELL</a:t>
             </a:r>
           </a:p>
@@ -4304,7 +4298,7 @@
         </p:nvCxnSpPr>
         <p:spPr>
           <a:xfrm>
-            <a:off x="1608939" y="1269908"/>
+            <a:off x="4327785" y="1388762"/>
             <a:ext cx="0" cy="237744"/>
           </a:xfrm>
           <a:prstGeom prst="straightConnector1">
@@ -4341,7 +4335,7 @@
         </p:nvCxnSpPr>
         <p:spPr>
           <a:xfrm>
-            <a:off x="2811330" y="2583460"/>
+            <a:off x="5610516" y="2452823"/>
             <a:ext cx="655869" cy="655574"/>
           </a:xfrm>
           <a:prstGeom prst="line">
@@ -4378,7 +4372,7 @@
         </p:nvCxnSpPr>
         <p:spPr>
           <a:xfrm flipV="1">
-            <a:off x="2130805" y="2586676"/>
+            <a:off x="4929991" y="2456039"/>
             <a:ext cx="680526" cy="667049"/>
           </a:xfrm>
           <a:prstGeom prst="line">
@@ -4415,8 +4409,8 @@
         </p:nvSpPr>
         <p:spPr>
           <a:xfrm>
-            <a:off x="3673179" y="3233148"/>
-            <a:ext cx="1723696" cy="523220"/>
+            <a:off x="6472365" y="3102511"/>
+            <a:ext cx="1723696" cy="461665"/>
           </a:xfrm>
           <a:prstGeom prst="rect">
             <a:avLst/>
@@ -4430,15 +4424,15 @@
           <a:lstStyle/>
           <a:p>
             <a:r>
-              <a:rPr lang="en-US" sz="1400" dirty="0" err="1"/>
+              <a:rPr lang="en-US" sz="1200" dirty="0" err="1"/>
               <a:t>ET</a:t>
             </a:r>
             <a:r>
-              <a:rPr lang="en-US" sz="1400" baseline="-25000" dirty="0" err="1"/>
+              <a:rPr lang="en-US" sz="1200" baseline="-25000" dirty="0" err="1"/>
               <a:t>a</a:t>
             </a:r>
             <a:r>
-              <a:rPr lang="en-US" sz="1400" dirty="0"/>
+              <a:rPr lang="en-US" sz="1200" dirty="0"/>
               <a:t> calculated by UZF/PRMS</a:t>
             </a:r>
           </a:p>
@@ -4452,8 +4446,8 @@
         </p:nvSpPr>
         <p:spPr>
           <a:xfrm>
-            <a:off x="577209" y="3229173"/>
-            <a:ext cx="1666057" cy="738664"/>
+            <a:off x="3376395" y="3098536"/>
+            <a:ext cx="1666057" cy="461665"/>
           </a:xfrm>
           <a:prstGeom prst="rect">
             <a:avLst/>
@@ -4467,16 +4461,16 @@
           <a:lstStyle/>
           <a:p>
             <a:r>
-              <a:rPr lang="en-US" sz="1400" dirty="0" err="1"/>
+              <a:rPr lang="en-US" sz="1200" dirty="0" err="1"/>
               <a:t>ET</a:t>
             </a:r>
             <a:r>
-              <a:rPr lang="en-US" sz="1400" baseline="-25000" dirty="0" err="1"/>
+              <a:rPr lang="en-US" sz="1200" baseline="-25000" dirty="0" err="1"/>
               <a:t>a</a:t>
             </a:r>
             <a:r>
-              <a:rPr lang="en-US" sz="1400" dirty="0"/>
-              <a:t> calculated in AGO using efficiency factor</a:t>
+              <a:rPr lang="en-US" sz="1200" dirty="0"/>
+              <a:t> calculated by AG using efficiency factor</a:t>
             </a:r>
           </a:p>
         </p:txBody>
@@ -4489,8 +4483,8 @@
         </p:nvSpPr>
         <p:spPr>
           <a:xfrm>
-            <a:off x="407109" y="3239034"/>
-            <a:ext cx="1723696" cy="955721"/>
+            <a:off x="3376393" y="3108397"/>
+            <a:ext cx="1553597" cy="424249"/>
           </a:xfrm>
           <a:prstGeom prst="rect">
             <a:avLst/>
@@ -4535,8 +4529,8 @@
         </p:nvSpPr>
         <p:spPr>
           <a:xfrm>
-            <a:off x="3467199" y="3239034"/>
-            <a:ext cx="1723696" cy="963670"/>
+            <a:off x="6266385" y="3108397"/>
+            <a:ext cx="1429913" cy="428927"/>
           </a:xfrm>
           <a:prstGeom prst="rect">
             <a:avLst/>
@@ -4576,12 +4570,14 @@
       <p:cxnSp>
         <p:nvCxnSpPr>
           <p:cNvPr id="38" name="Straight Connector 37"/>
-          <p:cNvCxnSpPr/>
+          <p:cNvCxnSpPr>
+            <a:cxnSpLocks/>
+          </p:cNvCxnSpPr>
           <p:nvPr/>
         </p:nvCxnSpPr>
         <p:spPr>
           <a:xfrm>
-            <a:off x="2122588" y="4185942"/>
+            <a:off x="4921774" y="3523456"/>
             <a:ext cx="656457" cy="675862"/>
           </a:xfrm>
           <a:prstGeom prst="line">
@@ -4618,7 +4614,7 @@
         </p:nvCxnSpPr>
         <p:spPr>
           <a:xfrm flipH="1">
-            <a:off x="2779045" y="4876078"/>
+            <a:off x="5578231" y="4204261"/>
             <a:ext cx="3" cy="225385"/>
           </a:xfrm>
           <a:prstGeom prst="straightConnector1">
@@ -4655,8 +4651,8 @@
         </p:nvGrpSpPr>
         <p:grpSpPr>
           <a:xfrm>
-            <a:off x="1740132" y="5107216"/>
-            <a:ext cx="2081315" cy="787562"/>
+            <a:off x="4539318" y="4435399"/>
+            <a:ext cx="2081315" cy="461665"/>
             <a:chOff x="1383236" y="5725378"/>
             <a:chExt cx="2801196" cy="955089"/>
           </a:xfrm>
@@ -4670,7 +4666,7 @@
           <p:spPr>
             <a:xfrm>
               <a:off x="1593916" y="5740069"/>
-              <a:ext cx="2488999" cy="523220"/>
+              <a:ext cx="2488999" cy="559869"/>
             </a:xfrm>
             <a:prstGeom prst="rect">
               <a:avLst/>
@@ -4685,7 +4681,7 @@
             <a:p>
               <a:pPr algn="ctr"/>
               <a:r>
-                <a:rPr lang="en-US" sz="1400" dirty="0"/>
+                <a:rPr lang="en-US" sz="1200" dirty="0"/>
                 <a:t>Return flows (SW+GW) calculated by UZF/PRMS</a:t>
               </a:r>
             </a:p>
@@ -4746,8 +4742,8 @@
         </p:nvSpPr>
         <p:spPr>
           <a:xfrm>
-            <a:off x="2405282" y="2851389"/>
-            <a:ext cx="854529" cy="523220"/>
+            <a:off x="5254610" y="2720752"/>
+            <a:ext cx="754245" cy="461665"/>
           </a:xfrm>
           <a:prstGeom prst="rect">
             <a:avLst/>
@@ -4762,14 +4758,14 @@
           <a:p>
             <a:pPr algn="ctr"/>
             <a:r>
-              <a:rPr lang="en-US" sz="1400" dirty="0"/>
+              <a:rPr lang="en-US" sz="1200" dirty="0"/>
               <a:t>SW/GW </a:t>
             </a:r>
           </a:p>
           <a:p>
             <a:pPr algn="ctr"/>
             <a:r>
-              <a:rPr lang="en-US" sz="1400" dirty="0"/>
+              <a:rPr lang="en-US" sz="1200" dirty="0"/>
               <a:t>Irrigation</a:t>
             </a:r>
           </a:p>
@@ -4783,10 +4779,10 @@
         </p:nvGrpSpPr>
         <p:grpSpPr>
           <a:xfrm>
-            <a:off x="2721930" y="424325"/>
-            <a:ext cx="2593537" cy="590705"/>
-            <a:chOff x="3017617" y="694857"/>
-            <a:chExt cx="2593537" cy="590705"/>
+            <a:off x="5503727" y="939660"/>
+            <a:ext cx="2593537" cy="449566"/>
+            <a:chOff x="3065545" y="659686"/>
+            <a:chExt cx="2593537" cy="625876"/>
           </a:xfrm>
         </p:grpSpPr>
         <p:sp>
@@ -4843,8 +4839,8 @@
           </p:nvSpPr>
           <p:spPr>
             <a:xfrm>
-              <a:off x="3017617" y="762342"/>
-              <a:ext cx="2593537" cy="523220"/>
+              <a:off x="3065545" y="659686"/>
+              <a:ext cx="2593537" cy="461665"/>
             </a:xfrm>
             <a:prstGeom prst="rect">
               <a:avLst/>
@@ -4859,10 +4855,9 @@
             <a:p>
               <a:pPr algn="ctr"/>
               <a:r>
-                <a:rPr lang="en-US" sz="1400" dirty="0"/>
+                <a:rPr lang="en-US" sz="1200" dirty="0"/>
                 <a:t>NIWR set using specified pumping rates in AG input</a:t>
               </a:r>
-              <a:endParaRPr lang="en-US" sz="1000" dirty="0"/>
             </a:p>
           </p:txBody>
         </p:sp>
@@ -4875,10 +4870,10 @@
         </p:nvGrpSpPr>
         <p:grpSpPr>
           <a:xfrm>
-            <a:off x="450916" y="1491685"/>
-            <a:ext cx="2332918" cy="828057"/>
-            <a:chOff x="7067376" y="1890798"/>
-            <a:chExt cx="2332918" cy="828057"/>
+            <a:off x="3155241" y="1615388"/>
+            <a:ext cx="2300558" cy="478003"/>
+            <a:chOff x="7060097" y="1890798"/>
+            <a:chExt cx="2300558" cy="828057"/>
           </a:xfrm>
         </p:grpSpPr>
         <p:sp>
@@ -4935,8 +4930,8 @@
           </p:nvSpPr>
           <p:spPr>
             <a:xfrm>
-              <a:off x="7099736" y="1958010"/>
-              <a:ext cx="2300558" cy="677108"/>
+              <a:off x="7060097" y="1895480"/>
+              <a:ext cx="2300558" cy="461665"/>
             </a:xfrm>
             <a:prstGeom prst="rect">
               <a:avLst/>
@@ -4951,14 +4946,14 @@
             <a:p>
               <a:pPr algn="ctr"/>
               <a:r>
-                <a:rPr lang="en-US" sz="1400" dirty="0"/>
+                <a:rPr lang="en-US" sz="1200" dirty="0"/>
                 <a:t>GW Demand set as SW shortfall</a:t>
               </a:r>
             </a:p>
             <a:p>
               <a:pPr algn="ctr"/>
               <a:r>
-                <a:rPr lang="en-US" sz="1000" dirty="0"/>
+                <a:rPr lang="en-US" sz="1200" dirty="0"/>
                 <a:t>(SUPPLEMENTALWELL)</a:t>
               </a:r>
             </a:p>
@@ -4973,7 +4968,7 @@
         </p:nvCxnSpPr>
         <p:spPr>
           <a:xfrm>
-            <a:off x="2822010" y="2592832"/>
+            <a:off x="5621196" y="2462195"/>
             <a:ext cx="1234440" cy="0"/>
           </a:xfrm>
           <a:prstGeom prst="line">
@@ -5008,7 +5003,7 @@
         </p:nvCxnSpPr>
         <p:spPr>
           <a:xfrm flipV="1">
-            <a:off x="4056450" y="2164696"/>
+            <a:off x="6862600" y="2056102"/>
             <a:ext cx="0" cy="423229"/>
           </a:xfrm>
           <a:prstGeom prst="line">
@@ -5037,30 +5032,271 @@
           </a:fontRef>
         </p:style>
       </p:cxnSp>
+      <p:sp>
+        <p:nvSpPr>
+          <p:cNvPr id="53" name="Rectangle 52"/>
+          <p:cNvSpPr/>
+          <p:nvPr/>
+        </p:nvSpPr>
+        <p:spPr>
+          <a:xfrm>
+            <a:off x="5898308" y="1657660"/>
+            <a:ext cx="1914656" cy="398442"/>
+          </a:xfrm>
+          <a:prstGeom prst="rect">
+            <a:avLst/>
+          </a:prstGeom>
+          <a:noFill/>
+          <a:ln>
+            <a:solidFill>
+              <a:schemeClr val="tx1"/>
+            </a:solidFill>
+          </a:ln>
+        </p:spPr>
+        <p:style>
+          <a:lnRef idx="2">
+            <a:schemeClr val="accent1">
+              <a:shade val="50000"/>
+            </a:schemeClr>
+          </a:lnRef>
+          <a:fillRef idx="1">
+            <a:schemeClr val="accent1"/>
+          </a:fillRef>
+          <a:effectRef idx="0">
+            <a:schemeClr val="accent1"/>
+          </a:effectRef>
+          <a:fontRef idx="minor">
+            <a:schemeClr val="lt1"/>
+          </a:fontRef>
+        </p:style>
+        <p:txBody>
+          <a:bodyPr rtlCol="0" anchor="ctr"/>
+          <a:lstStyle/>
+          <a:p>
+            <a:pPr algn="ctr"/>
+            <a:endParaRPr lang="en-US"/>
+          </a:p>
+        </p:txBody>
+      </p:sp>
+      <p:sp>
+        <p:nvSpPr>
+          <p:cNvPr id="54" name="TextBox 53"/>
+          <p:cNvSpPr txBox="1"/>
+          <p:nvPr/>
+        </p:nvSpPr>
+        <p:spPr>
+          <a:xfrm>
+            <a:off x="5478646" y="1606324"/>
+            <a:ext cx="2735317" cy="523133"/>
+          </a:xfrm>
+          <a:prstGeom prst="rect">
+            <a:avLst/>
+          </a:prstGeom>
+          <a:noFill/>
+        </p:spPr>
+        <p:txBody>
+          <a:bodyPr wrap="square" rtlCol="0">
+            <a:spAutoFit/>
+          </a:bodyPr>
+          <a:lstStyle/>
+          <a:p>
+            <a:pPr algn="ctr"/>
+            <a:r>
+              <a:rPr lang="en-US" sz="1200" dirty="0"/>
+              <a:t>GW irrigation</a:t>
+            </a:r>
+          </a:p>
+          <a:p>
+            <a:pPr algn="ctr"/>
+            <a:r>
+              <a:rPr lang="en-US" sz="1200" dirty="0"/>
+              <a:t>(IRRIGATIONWELL)</a:t>
+            </a:r>
+          </a:p>
+          <a:p>
+            <a:pPr algn="ctr"/>
+            <a:endParaRPr lang="en-US" sz="1400" dirty="0"/>
+          </a:p>
+        </p:txBody>
+      </p:sp>
+      <p:cxnSp>
+        <p:nvCxnSpPr>
+          <p:cNvPr id="59" name="Straight Arrow Connector 58"/>
+          <p:cNvCxnSpPr>
+            <a:cxnSpLocks/>
+            <a:endCxn id="53" idx="1"/>
+          </p:cNvCxnSpPr>
+          <p:nvPr/>
+        </p:nvCxnSpPr>
+        <p:spPr>
+          <a:xfrm>
+            <a:off x="5455799" y="1854389"/>
+            <a:ext cx="442509" cy="2492"/>
+          </a:xfrm>
+          <a:prstGeom prst="straightConnector1">
+            <a:avLst/>
+          </a:prstGeom>
+          <a:ln w="19050">
+            <a:solidFill>
+              <a:schemeClr val="tx1"/>
+            </a:solidFill>
+            <a:headEnd type="none" w="med" len="med"/>
+            <a:tailEnd type="triangle" w="med" len="med"/>
+          </a:ln>
+        </p:spPr>
+        <p:style>
+          <a:lnRef idx="1">
+            <a:schemeClr val="accent1"/>
+          </a:lnRef>
+          <a:fillRef idx="0">
+            <a:schemeClr val="accent1"/>
+          </a:fillRef>
+          <a:effectRef idx="0">
+            <a:schemeClr val="accent1"/>
+          </a:effectRef>
+          <a:fontRef idx="minor">
+            <a:schemeClr val="tx1"/>
+          </a:fontRef>
+        </p:style>
+      </p:cxnSp>
+      <p:cxnSp>
+        <p:nvCxnSpPr>
+          <p:cNvPr id="66" name="Straight Arrow Connector 65"/>
+          <p:cNvCxnSpPr>
+            <a:cxnSpLocks/>
+          </p:cNvCxnSpPr>
+          <p:nvPr/>
+        </p:nvCxnSpPr>
+        <p:spPr>
+          <a:xfrm>
+            <a:off x="6846305" y="1388762"/>
+            <a:ext cx="0" cy="280380"/>
+          </a:xfrm>
+          <a:prstGeom prst="straightConnector1">
+            <a:avLst/>
+          </a:prstGeom>
+          <a:ln w="19050">
+            <a:solidFill>
+              <a:schemeClr val="tx1"/>
+            </a:solidFill>
+            <a:headEnd type="none" w="med" len="med"/>
+            <a:tailEnd type="triangle" w="med" len="med"/>
+          </a:ln>
+        </p:spPr>
+        <p:style>
+          <a:lnRef idx="1">
+            <a:schemeClr val="accent1"/>
+          </a:lnRef>
+          <a:fillRef idx="0">
+            <a:schemeClr val="accent1"/>
+          </a:fillRef>
+          <a:effectRef idx="0">
+            <a:schemeClr val="accent1"/>
+          </a:effectRef>
+          <a:fontRef idx="minor">
+            <a:schemeClr val="tx1"/>
+          </a:fontRef>
+        </p:style>
+      </p:cxnSp>
+      <p:cxnSp>
+        <p:nvCxnSpPr>
+          <p:cNvPr id="70" name="Straight Connector 69"/>
+          <p:cNvCxnSpPr>
+            <a:cxnSpLocks/>
+          </p:cNvCxnSpPr>
+          <p:nvPr/>
+        </p:nvCxnSpPr>
+        <p:spPr>
+          <a:xfrm flipV="1">
+            <a:off x="5582045" y="3532269"/>
+            <a:ext cx="680526" cy="667049"/>
+          </a:xfrm>
+          <a:prstGeom prst="line">
+            <a:avLst/>
+          </a:prstGeom>
+          <a:ln w="12700">
+            <a:solidFill>
+              <a:schemeClr val="tx1"/>
+            </a:solidFill>
+            <a:headEnd type="none" w="med" len="med"/>
+            <a:tailEnd type="none" w="med" len="med"/>
+          </a:ln>
+        </p:spPr>
+        <p:style>
+          <a:lnRef idx="1">
+            <a:schemeClr val="accent1"/>
+          </a:lnRef>
+          <a:fillRef idx="0">
+            <a:schemeClr val="accent1"/>
+          </a:fillRef>
+          <a:effectRef idx="0">
+            <a:schemeClr val="accent1"/>
+          </a:effectRef>
+          <a:fontRef idx="minor">
+            <a:schemeClr val="tx1"/>
+          </a:fontRef>
+        </p:style>
+      </p:cxnSp>
+    </p:spTree>
+    <p:extLst>
+      <p:ext uri="{BB962C8B-B14F-4D97-AF65-F5344CB8AC3E}">
+        <p14:creationId xmlns:p14="http://schemas.microsoft.com/office/powerpoint/2010/main" val="762815989"/>
+      </p:ext>
+    </p:extLst>
+  </p:cSld>
+  <p:clrMapOvr>
+    <a:masterClrMapping/>
+  </p:clrMapOvr>
+</p:sld>
+</file>
+
+<file path=ppt/slides/slide4.xml><?xml version="1.0" encoding="utf-8"?>
+<p:sld xmlns:a="http://schemas.openxmlformats.org/drawingml/2006/main" xmlns:r="http://schemas.openxmlformats.org/officeDocument/2006/relationships" xmlns:p="http://schemas.openxmlformats.org/presentationml/2006/main">
+  <p:cSld>
+    <p:spTree>
+      <p:nvGrpSpPr>
+        <p:cNvPr id="1" name=""/>
+        <p:cNvGrpSpPr/>
+        <p:nvPr/>
+      </p:nvGrpSpPr>
+      <p:grpSpPr>
+        <a:xfrm>
+          <a:off x="0" y="0"/>
+          <a:ext cx="0" cy="0"/>
+          <a:chOff x="0" y="0"/>
+          <a:chExt cx="0" cy="0"/>
+        </a:xfrm>
+      </p:grpSpPr>
       <p:grpSp>
         <p:nvGrpSpPr>
-          <p:cNvPr id="55" name="Group 54"/>
+          <p:cNvPr id="22" name="Group 21">
+            <a:extLst>
+              <a:ext uri="{FF2B5EF4-FFF2-40B4-BE49-F238E27FC236}">
+                <a16:creationId xmlns:a16="http://schemas.microsoft.com/office/drawing/2014/main" id="{B9B84497-0B26-42E7-8691-9E2BAA3E5A37}"/>
+              </a:ext>
+            </a:extLst>
+          </p:cNvPr>
           <p:cNvGrpSpPr/>
           <p:nvPr/>
         </p:nvGrpSpPr>
         <p:grpSpPr>
           <a:xfrm>
-            <a:off x="2688792" y="1635808"/>
-            <a:ext cx="2735317" cy="677108"/>
-            <a:chOff x="6432170" y="2284479"/>
-            <a:chExt cx="2735317" cy="677108"/>
+            <a:off x="277319" y="162113"/>
+            <a:ext cx="6951072" cy="5857629"/>
+            <a:chOff x="277319" y="162113"/>
+            <a:chExt cx="6951072" cy="5857629"/>
           </a:xfrm>
         </p:grpSpPr>
         <p:sp>
           <p:nvSpPr>
-            <p:cNvPr id="53" name="Rectangle 52"/>
+            <p:cNvPr id="4" name="Rectangle 3"/>
             <p:cNvSpPr/>
             <p:nvPr/>
           </p:nvSpPr>
           <p:spPr>
             <a:xfrm>
-              <a:off x="6689967" y="2287869"/>
-              <a:ext cx="2286000" cy="515716"/>
+              <a:off x="2202207" y="3474438"/>
+              <a:ext cx="2495871" cy="859220"/>
             </a:xfrm>
             <a:prstGeom prst="rect">
               <a:avLst/>
@@ -5099,14 +5335,14 @@
         </p:sp>
         <p:sp>
           <p:nvSpPr>
-            <p:cNvPr id="54" name="TextBox 53"/>
+            <p:cNvPr id="5" name="TextBox 4"/>
             <p:cNvSpPr txBox="1"/>
             <p:nvPr/>
           </p:nvSpPr>
           <p:spPr>
             <a:xfrm>
-              <a:off x="6432170" y="2284479"/>
-              <a:ext cx="2735317" cy="677108"/>
+              <a:off x="2136654" y="3481324"/>
+              <a:ext cx="2561424" cy="830997"/>
             </a:xfrm>
             <a:prstGeom prst="rect">
               <a:avLst/>
@@ -5121,335 +5357,88 @@
             <a:p>
               <a:pPr algn="ctr"/>
               <a:r>
-                <a:rPr lang="en-US" sz="1400" dirty="0"/>
-                <a:t>GW irrigation</a:t>
+                <a:rPr lang="en-US" sz="1200" dirty="0"/>
+                <a:t>SW diversion set as Irrigation demand, and limited by available flow and water right</a:t>
               </a:r>
             </a:p>
             <a:p>
               <a:pPr algn="ctr"/>
               <a:r>
-                <a:rPr lang="en-US" sz="1000" dirty="0"/>
-                <a:t>(IRRIGATIONWELL)</a:t>
+                <a:rPr lang="en-US" sz="1200" dirty="0"/>
+                <a:t>(IRRIGATIONDIVERSION)</a:t>
               </a:r>
-            </a:p>
-            <a:p>
-              <a:pPr algn="ctr"/>
-              <a:endParaRPr lang="en-US" sz="1400" dirty="0"/>
             </a:p>
           </p:txBody>
         </p:sp>
-      </p:grpSp>
-      <p:cxnSp>
-        <p:nvCxnSpPr>
-          <p:cNvPr id="59" name="Straight Arrow Connector 58"/>
-          <p:cNvCxnSpPr/>
-          <p:nvPr/>
-        </p:nvCxnSpPr>
-        <p:spPr>
-          <a:xfrm>
-            <a:off x="2721930" y="1887000"/>
-            <a:ext cx="228600" cy="0"/>
-          </a:xfrm>
-          <a:prstGeom prst="straightConnector1">
-            <a:avLst/>
-          </a:prstGeom>
-          <a:ln w="19050">
-            <a:solidFill>
+        <p:sp>
+          <p:nvSpPr>
+            <p:cNvPr id="6" name="TextBox 5"/>
+            <p:cNvSpPr txBox="1"/>
+            <p:nvPr/>
+          </p:nvSpPr>
+          <p:spPr>
+            <a:xfrm>
+              <a:off x="277319" y="162113"/>
+              <a:ext cx="4572001" cy="646331"/>
+            </a:xfrm>
+            <a:prstGeom prst="rect">
+              <a:avLst/>
+            </a:prstGeom>
+            <a:noFill/>
+          </p:spPr>
+          <p:txBody>
+            <a:bodyPr wrap="square" rtlCol="0">
+              <a:spAutoFit/>
+            </a:bodyPr>
+            <a:lstStyle/>
+            <a:p>
+              <a:r>
+                <a:rPr lang="en-US" sz="1200" dirty="0"/>
+                <a:t>C) Surface water (SW) and groundwater (GW) irrigation using IRRIGATION_SFR and IRRIGATION_WELL; demand calculated as ET deficit using ETDEMAND.</a:t>
+              </a:r>
+            </a:p>
+          </p:txBody>
+        </p:sp>
+        <p:cxnSp>
+          <p:nvCxnSpPr>
+            <p:cNvPr id="8" name="Straight Arrow Connector 7"/>
+            <p:cNvCxnSpPr>
+              <a:cxnSpLocks/>
+              <a:endCxn id="70" idx="0"/>
+            </p:cNvCxnSpPr>
+            <p:nvPr/>
+          </p:nvCxnSpPr>
+          <p:spPr>
+            <a:xfrm>
+              <a:off x="3441639" y="4333658"/>
+              <a:ext cx="0" cy="330434"/>
+            </a:xfrm>
+            <a:prstGeom prst="straightConnector1">
+              <a:avLst/>
+            </a:prstGeom>
+            <a:ln w="19050">
+              <a:solidFill>
+                <a:schemeClr val="tx1"/>
+              </a:solidFill>
+              <a:headEnd type="none" w="med" len="med"/>
+              <a:tailEnd type="triangle" w="med" len="med"/>
+            </a:ln>
+          </p:spPr>
+          <p:style>
+            <a:lnRef idx="1">
+              <a:schemeClr val="accent1"/>
+            </a:lnRef>
+            <a:fillRef idx="0">
+              <a:schemeClr val="accent1"/>
+            </a:fillRef>
+            <a:effectRef idx="0">
+              <a:schemeClr val="accent1"/>
+            </a:effectRef>
+            <a:fontRef idx="minor">
               <a:schemeClr val="tx1"/>
-            </a:solidFill>
-            <a:headEnd type="none" w="med" len="med"/>
-            <a:tailEnd type="triangle" w="med" len="med"/>
-          </a:ln>
-        </p:spPr>
-        <p:style>
-          <a:lnRef idx="1">
-            <a:schemeClr val="accent1"/>
-          </a:lnRef>
-          <a:fillRef idx="0">
-            <a:schemeClr val="accent1"/>
-          </a:fillRef>
-          <a:effectRef idx="0">
-            <a:schemeClr val="accent1"/>
-          </a:effectRef>
-          <a:fontRef idx="minor">
-            <a:schemeClr val="tx1"/>
-          </a:fontRef>
-        </p:style>
-      </p:cxnSp>
-      <p:cxnSp>
-        <p:nvCxnSpPr>
-          <p:cNvPr id="66" name="Straight Arrow Connector 65"/>
-          <p:cNvCxnSpPr>
-            <a:endCxn id="54" idx="0"/>
-          </p:cNvCxnSpPr>
-          <p:nvPr/>
-        </p:nvCxnSpPr>
-        <p:spPr>
-          <a:xfrm flipH="1">
-            <a:off x="4056451" y="1015030"/>
-            <a:ext cx="10176" cy="620778"/>
-          </a:xfrm>
-          <a:prstGeom prst="straightConnector1">
-            <a:avLst/>
-          </a:prstGeom>
-          <a:ln w="19050">
-            <a:solidFill>
-              <a:schemeClr val="tx1"/>
-            </a:solidFill>
-            <a:headEnd type="none" w="med" len="med"/>
-            <a:tailEnd type="triangle" w="med" len="med"/>
-          </a:ln>
-        </p:spPr>
-        <p:style>
-          <a:lnRef idx="1">
-            <a:schemeClr val="accent1"/>
-          </a:lnRef>
-          <a:fillRef idx="0">
-            <a:schemeClr val="accent1"/>
-          </a:fillRef>
-          <a:effectRef idx="0">
-            <a:schemeClr val="accent1"/>
-          </a:effectRef>
-          <a:fontRef idx="minor">
-            <a:schemeClr val="tx1"/>
-          </a:fontRef>
-        </p:style>
-      </p:cxnSp>
-      <p:cxnSp>
-        <p:nvCxnSpPr>
-          <p:cNvPr id="70" name="Straight Connector 69"/>
-          <p:cNvCxnSpPr/>
-          <p:nvPr/>
-        </p:nvCxnSpPr>
-        <p:spPr>
-          <a:xfrm flipV="1">
-            <a:off x="2782859" y="4194755"/>
-            <a:ext cx="680526" cy="667049"/>
-          </a:xfrm>
-          <a:prstGeom prst="line">
-            <a:avLst/>
-          </a:prstGeom>
-          <a:ln w="12700">
-            <a:solidFill>
-              <a:schemeClr val="tx1"/>
-            </a:solidFill>
-            <a:headEnd type="none" w="med" len="med"/>
-            <a:tailEnd type="none" w="med" len="med"/>
-          </a:ln>
-        </p:spPr>
-        <p:style>
-          <a:lnRef idx="1">
-            <a:schemeClr val="accent1"/>
-          </a:lnRef>
-          <a:fillRef idx="0">
-            <a:schemeClr val="accent1"/>
-          </a:fillRef>
-          <a:effectRef idx="0">
-            <a:schemeClr val="accent1"/>
-          </a:effectRef>
-          <a:fontRef idx="minor">
-            <a:schemeClr val="tx1"/>
-          </a:fontRef>
-        </p:style>
-      </p:cxnSp>
-    </p:spTree>
-    <p:extLst>
-      <p:ext uri="{BB962C8B-B14F-4D97-AF65-F5344CB8AC3E}">
-        <p14:creationId xmlns:p14="http://schemas.microsoft.com/office/powerpoint/2010/main" val="762815989"/>
-      </p:ext>
-    </p:extLst>
-  </p:cSld>
-  <p:clrMapOvr>
-    <a:masterClrMapping/>
-  </p:clrMapOvr>
-</p:sld>
-</file>
-
-<file path=ppt/slides/slide4.xml><?xml version="1.0" encoding="utf-8"?>
-<p:sld xmlns:a="http://schemas.openxmlformats.org/drawingml/2006/main" xmlns:r="http://schemas.openxmlformats.org/officeDocument/2006/relationships" xmlns:p="http://schemas.openxmlformats.org/presentationml/2006/main">
-  <p:cSld>
-    <p:spTree>
-      <p:nvGrpSpPr>
-        <p:cNvPr id="1" name=""/>
-        <p:cNvGrpSpPr/>
-        <p:nvPr/>
-      </p:nvGrpSpPr>
-      <p:grpSpPr>
-        <a:xfrm>
-          <a:off x="0" y="0"/>
-          <a:ext cx="0" cy="0"/>
-          <a:chOff x="0" y="0"/>
-          <a:chExt cx="0" cy="0"/>
-        </a:xfrm>
-      </p:grpSpPr>
-      <p:sp>
-        <p:nvSpPr>
-          <p:cNvPr id="4" name="Rectangle 3"/>
-          <p:cNvSpPr/>
-          <p:nvPr/>
-        </p:nvSpPr>
-        <p:spPr>
-          <a:xfrm>
-            <a:off x="2242230" y="3959154"/>
-            <a:ext cx="2495871" cy="859220"/>
-          </a:xfrm>
-          <a:prstGeom prst="rect">
-            <a:avLst/>
-          </a:prstGeom>
-          <a:noFill/>
-          <a:ln>
-            <a:solidFill>
-              <a:schemeClr val="tx1"/>
-            </a:solidFill>
-          </a:ln>
-        </p:spPr>
-        <p:style>
-          <a:lnRef idx="2">
-            <a:schemeClr val="accent1">
-              <a:shade val="50000"/>
-            </a:schemeClr>
-          </a:lnRef>
-          <a:fillRef idx="1">
-            <a:schemeClr val="accent1"/>
-          </a:fillRef>
-          <a:effectRef idx="0">
-            <a:schemeClr val="accent1"/>
-          </a:effectRef>
-          <a:fontRef idx="minor">
-            <a:schemeClr val="lt1"/>
-          </a:fontRef>
-        </p:style>
-        <p:txBody>
-          <a:bodyPr rtlCol="0" anchor="ctr"/>
-          <a:lstStyle/>
-          <a:p>
-            <a:pPr algn="ctr"/>
-            <a:endParaRPr lang="en-US"/>
-          </a:p>
-        </p:txBody>
-      </p:sp>
-      <p:sp>
-        <p:nvSpPr>
-          <p:cNvPr id="5" name="TextBox 4"/>
-          <p:cNvSpPr txBox="1"/>
-          <p:nvPr/>
-        </p:nvSpPr>
-        <p:spPr>
-          <a:xfrm>
-            <a:off x="2176677" y="3966040"/>
-            <a:ext cx="2561424" cy="892552"/>
-          </a:xfrm>
-          <a:prstGeom prst="rect">
-            <a:avLst/>
-          </a:prstGeom>
-          <a:noFill/>
-        </p:spPr>
-        <p:txBody>
-          <a:bodyPr wrap="square" rtlCol="0">
-            <a:spAutoFit/>
-          </a:bodyPr>
-          <a:lstStyle/>
-          <a:p>
-            <a:pPr algn="ctr"/>
-            <a:r>
-              <a:rPr lang="en-US" sz="1400" dirty="0"/>
-              <a:t>SW diversion set as Irrigation demand, and limited by the lesser of “FLOW” and </a:t>
-            </a:r>
-            <a:r>
-              <a:rPr lang="en-US" sz="1400" dirty="0" err="1"/>
-              <a:t>Qseg</a:t>
-            </a:r>
-            <a:endParaRPr lang="en-US" sz="1400" dirty="0"/>
-          </a:p>
-          <a:p>
-            <a:pPr algn="ctr"/>
-            <a:r>
-              <a:rPr lang="en-US" sz="1000" dirty="0"/>
-              <a:t>(IRRIGATIONSEGMENT)</a:t>
-            </a:r>
-          </a:p>
-        </p:txBody>
-      </p:sp>
-      <p:sp>
-        <p:nvSpPr>
-          <p:cNvPr id="6" name="TextBox 5"/>
-          <p:cNvSpPr txBox="1"/>
-          <p:nvPr/>
-        </p:nvSpPr>
-        <p:spPr>
-          <a:xfrm>
-            <a:off x="6310410" y="105386"/>
-            <a:ext cx="4572001" cy="1200329"/>
-          </a:xfrm>
-          <a:prstGeom prst="rect">
-            <a:avLst/>
-          </a:prstGeom>
-          <a:noFill/>
-        </p:spPr>
-        <p:txBody>
-          <a:bodyPr wrap="square" rtlCol="0">
-            <a:spAutoFit/>
-          </a:bodyPr>
-          <a:lstStyle/>
-          <a:p>
-            <a:r>
-              <a:rPr lang="en-US" dirty="0"/>
-              <a:t>C) Surface water (SW) and groundwater (GW) irrigation using IRRIGATION_SFR and IRRIGATION_WELL; demand calculated as ET deficit using ETDEMAND.</a:t>
-            </a:r>
-          </a:p>
-        </p:txBody>
-      </p:sp>
-      <p:cxnSp>
-        <p:nvCxnSpPr>
-          <p:cNvPr id="8" name="Straight Arrow Connector 7"/>
-          <p:cNvCxnSpPr/>
-          <p:nvPr/>
-        </p:nvCxnSpPr>
-        <p:spPr>
-          <a:xfrm>
-            <a:off x="3481662" y="4818374"/>
-            <a:ext cx="0" cy="304371"/>
-          </a:xfrm>
-          <a:prstGeom prst="straightConnector1">
-            <a:avLst/>
-          </a:prstGeom>
-          <a:ln w="19050">
-            <a:solidFill>
-              <a:schemeClr val="tx1"/>
-            </a:solidFill>
-            <a:headEnd type="none" w="med" len="med"/>
-            <a:tailEnd type="triangle" w="med" len="med"/>
-          </a:ln>
-        </p:spPr>
-        <p:style>
-          <a:lnRef idx="1">
-            <a:schemeClr val="accent1"/>
-          </a:lnRef>
-          <a:fillRef idx="0">
-            <a:schemeClr val="accent1"/>
-          </a:fillRef>
-          <a:effectRef idx="0">
-            <a:schemeClr val="accent1"/>
-          </a:effectRef>
-          <a:fontRef idx="minor">
-            <a:schemeClr val="tx1"/>
-          </a:fontRef>
-        </p:style>
-      </p:cxnSp>
-      <p:grpSp>
-        <p:nvGrpSpPr>
-          <p:cNvPr id="24" name="Group 23"/>
-          <p:cNvGrpSpPr/>
-          <p:nvPr/>
-        </p:nvGrpSpPr>
-        <p:grpSpPr>
-          <a:xfrm>
-            <a:off x="2283264" y="2866831"/>
-            <a:ext cx="2292933" cy="859220"/>
-            <a:chOff x="3001270" y="964346"/>
-            <a:chExt cx="2378396" cy="859220"/>
-          </a:xfrm>
-        </p:grpSpPr>
+            </a:fontRef>
+          </p:style>
+        </p:cxnSp>
         <p:sp>
           <p:nvSpPr>
             <p:cNvPr id="25" name="Rectangle 24"/>
@@ -5458,8 +5447,8 @@
           </p:nvSpPr>
           <p:spPr>
             <a:xfrm>
-              <a:off x="3034956" y="964346"/>
-              <a:ext cx="2286000" cy="859220"/>
+              <a:off x="2353070" y="2393321"/>
+              <a:ext cx="2203857" cy="618040"/>
             </a:xfrm>
             <a:prstGeom prst="rect">
               <a:avLst/>
@@ -5504,8 +5493,8 @@
           </p:nvSpPr>
           <p:spPr>
             <a:xfrm>
-              <a:off x="3001270" y="1091212"/>
-              <a:ext cx="2378396" cy="677108"/>
+              <a:off x="2311395" y="2375039"/>
+              <a:ext cx="2292933" cy="605244"/>
             </a:xfrm>
             <a:prstGeom prst="rect">
               <a:avLst/>
@@ -5520,51 +5509,1197 @@
             <a:p>
               <a:pPr algn="ctr"/>
               <a:r>
-                <a:rPr lang="en-US" sz="1400" dirty="0"/>
+                <a:rPr lang="en-US" sz="1200" dirty="0"/>
                 <a:t>Irrigation demand calculated using f(</a:t>
               </a:r>
               <a:r>
-                <a:rPr lang="en-US" sz="1400" dirty="0" err="1"/>
+                <a:rPr lang="en-US" sz="1200" dirty="0" err="1"/>
                 <a:t>ET</a:t>
               </a:r>
               <a:r>
-                <a:rPr lang="en-US" sz="1400" baseline="-25000" dirty="0" err="1"/>
+                <a:rPr lang="en-US" sz="1200" baseline="-25000" dirty="0" err="1"/>
                 <a:t>d</a:t>
               </a:r>
               <a:r>
-                <a:rPr lang="en-US" sz="1400" dirty="0" err="1"/>
+                <a:rPr lang="en-US" sz="1200" dirty="0" err="1"/>
                 <a:t>-ET</a:t>
               </a:r>
               <a:r>
-                <a:rPr lang="en-US" sz="1400" baseline="-25000" dirty="0" err="1"/>
+                <a:rPr lang="en-US" sz="1200" baseline="-25000" dirty="0" err="1"/>
                 <a:t>a</a:t>
               </a:r>
               <a:r>
-                <a:rPr lang="en-US" sz="1400" dirty="0"/>
+                <a:rPr lang="en-US" sz="1200" dirty="0"/>
                 <a:t>)</a:t>
               </a:r>
-              <a:endParaRPr lang="en-US" sz="1400" baseline="-25000" dirty="0"/>
+              <a:endParaRPr lang="en-US" sz="1200" baseline="-25000" dirty="0"/>
             </a:p>
             <a:p>
               <a:pPr algn="ctr"/>
               <a:r>
-                <a:rPr lang="en-US" sz="1000" dirty="0"/>
+                <a:rPr lang="en-US" sz="1200" dirty="0"/>
                 <a:t>(ETDEMAND)</a:t>
               </a:r>
             </a:p>
           </p:txBody>
         </p:sp>
+        <p:sp>
+          <p:nvSpPr>
+            <p:cNvPr id="37" name="Rectangle 36"/>
+            <p:cNvSpPr/>
+            <p:nvPr/>
+          </p:nvSpPr>
+          <p:spPr>
+            <a:xfrm>
+              <a:off x="2751020" y="1761129"/>
+              <a:ext cx="1332693" cy="419625"/>
+            </a:xfrm>
+            <a:prstGeom prst="rect">
+              <a:avLst/>
+            </a:prstGeom>
+            <a:noFill/>
+            <a:ln>
+              <a:solidFill>
+                <a:schemeClr val="tx1"/>
+              </a:solidFill>
+            </a:ln>
+          </p:spPr>
+          <p:style>
+            <a:lnRef idx="2">
+              <a:schemeClr val="accent1">
+                <a:shade val="50000"/>
+              </a:schemeClr>
+            </a:lnRef>
+            <a:fillRef idx="1">
+              <a:schemeClr val="accent1"/>
+            </a:fillRef>
+            <a:effectRef idx="0">
+              <a:schemeClr val="accent1"/>
+            </a:effectRef>
+            <a:fontRef idx="minor">
+              <a:schemeClr val="lt1"/>
+            </a:fontRef>
+          </p:style>
+          <p:txBody>
+            <a:bodyPr rtlCol="0" anchor="ctr"/>
+            <a:lstStyle/>
+            <a:p>
+              <a:pPr algn="ctr"/>
+              <a:endParaRPr lang="en-US"/>
+            </a:p>
+          </p:txBody>
+        </p:sp>
+        <p:sp>
+          <p:nvSpPr>
+            <p:cNvPr id="40" name="TextBox 39"/>
+            <p:cNvSpPr txBox="1"/>
+            <p:nvPr/>
+          </p:nvSpPr>
+          <p:spPr>
+            <a:xfrm>
+              <a:off x="2594378" y="1746044"/>
+              <a:ext cx="1723696" cy="461665"/>
+            </a:xfrm>
+            <a:prstGeom prst="rect">
+              <a:avLst/>
+            </a:prstGeom>
+            <a:noFill/>
+          </p:spPr>
+          <p:txBody>
+            <a:bodyPr wrap="square" rtlCol="0">
+              <a:spAutoFit/>
+            </a:bodyPr>
+            <a:lstStyle/>
+            <a:p>
+              <a:pPr algn="ctr"/>
+              <a:r>
+                <a:rPr lang="en-US" sz="1200" dirty="0" err="1"/>
+                <a:t>ETa</a:t>
+              </a:r>
+              <a:r>
+                <a:rPr lang="en-US" sz="1200" dirty="0"/>
+                <a:t> is calculated by UZF/PRMS</a:t>
+              </a:r>
+            </a:p>
+          </p:txBody>
+        </p:sp>
+        <p:cxnSp>
+          <p:nvCxnSpPr>
+            <p:cNvPr id="41" name="Straight Arrow Connector 40"/>
+            <p:cNvCxnSpPr/>
+            <p:nvPr/>
+          </p:nvCxnSpPr>
+          <p:spPr>
+            <a:xfrm>
+              <a:off x="3417366" y="2194294"/>
+              <a:ext cx="0" cy="225385"/>
+            </a:xfrm>
+            <a:prstGeom prst="straightConnector1">
+              <a:avLst/>
+            </a:prstGeom>
+            <a:ln w="19050">
+              <a:solidFill>
+                <a:schemeClr val="tx1"/>
+              </a:solidFill>
+              <a:headEnd type="none" w="med" len="med"/>
+              <a:tailEnd type="triangle" w="med" len="med"/>
+            </a:ln>
+          </p:spPr>
+          <p:style>
+            <a:lnRef idx="1">
+              <a:schemeClr val="accent1"/>
+            </a:lnRef>
+            <a:fillRef idx="0">
+              <a:schemeClr val="accent1"/>
+            </a:fillRef>
+            <a:effectRef idx="0">
+              <a:schemeClr val="accent1"/>
+            </a:effectRef>
+            <a:fontRef idx="minor">
+              <a:schemeClr val="tx1"/>
+            </a:fontRef>
+          </p:style>
+        </p:cxnSp>
+        <p:cxnSp>
+          <p:nvCxnSpPr>
+            <p:cNvPr id="48" name="Straight Arrow Connector 47"/>
+            <p:cNvCxnSpPr>
+              <a:cxnSpLocks/>
+            </p:cNvCxnSpPr>
+            <p:nvPr/>
+          </p:nvCxnSpPr>
+          <p:spPr>
+            <a:xfrm>
+              <a:off x="3441297" y="3011361"/>
+              <a:ext cx="0" cy="453946"/>
+            </a:xfrm>
+            <a:prstGeom prst="straightConnector1">
+              <a:avLst/>
+            </a:prstGeom>
+            <a:ln w="19050">
+              <a:solidFill>
+                <a:schemeClr val="tx1"/>
+              </a:solidFill>
+              <a:headEnd type="none" w="med" len="med"/>
+              <a:tailEnd type="triangle" w="med" len="med"/>
+            </a:ln>
+          </p:spPr>
+          <p:style>
+            <a:lnRef idx="1">
+              <a:schemeClr val="accent1"/>
+            </a:lnRef>
+            <a:fillRef idx="0">
+              <a:schemeClr val="accent1"/>
+            </a:fillRef>
+            <a:effectRef idx="0">
+              <a:schemeClr val="accent1"/>
+            </a:effectRef>
+            <a:fontRef idx="minor">
+              <a:schemeClr val="tx1"/>
+            </a:fontRef>
+          </p:style>
+        </p:cxnSp>
+        <p:sp>
+          <p:nvSpPr>
+            <p:cNvPr id="16" name="TextBox 15"/>
+            <p:cNvSpPr txBox="1"/>
+            <p:nvPr/>
+          </p:nvSpPr>
+          <p:spPr>
+            <a:xfrm>
+              <a:off x="3467297" y="4356541"/>
+              <a:ext cx="3761094" cy="276999"/>
+            </a:xfrm>
+            <a:prstGeom prst="rect">
+              <a:avLst/>
+            </a:prstGeom>
+            <a:noFill/>
+          </p:spPr>
+          <p:txBody>
+            <a:bodyPr wrap="none" rtlCol="0">
+              <a:spAutoFit/>
+            </a:bodyPr>
+            <a:lstStyle/>
+            <a:p>
+              <a:r>
+                <a:rPr lang="en-US" sz="1200" dirty="0"/>
+                <a:t>Diversion less than demand with supplemental GW rights</a:t>
+              </a:r>
+            </a:p>
+          </p:txBody>
+        </p:sp>
+        <p:cxnSp>
+          <p:nvCxnSpPr>
+            <p:cNvPr id="29" name="Straight Connector 28"/>
+            <p:cNvCxnSpPr>
+              <a:cxnSpLocks/>
+              <a:endCxn id="49" idx="3"/>
+            </p:cNvCxnSpPr>
+            <p:nvPr/>
+          </p:nvCxnSpPr>
+          <p:spPr>
+            <a:xfrm flipH="1" flipV="1">
+              <a:off x="1766654" y="5616793"/>
+              <a:ext cx="533210" cy="0"/>
+            </a:xfrm>
+            <a:prstGeom prst="line">
+              <a:avLst/>
+            </a:prstGeom>
+            <a:ln w="19050">
+              <a:solidFill>
+                <a:schemeClr val="tx1"/>
+              </a:solidFill>
+            </a:ln>
+          </p:spPr>
+          <p:style>
+            <a:lnRef idx="1">
+              <a:schemeClr val="accent1"/>
+            </a:lnRef>
+            <a:fillRef idx="0">
+              <a:schemeClr val="accent1"/>
+            </a:fillRef>
+            <a:effectRef idx="0">
+              <a:schemeClr val="accent1"/>
+            </a:effectRef>
+            <a:fontRef idx="minor">
+              <a:schemeClr val="tx1"/>
+            </a:fontRef>
+          </p:style>
+        </p:cxnSp>
+        <p:cxnSp>
+          <p:nvCxnSpPr>
+            <p:cNvPr id="32" name="Straight Connector 31"/>
+            <p:cNvCxnSpPr/>
+            <p:nvPr/>
+          </p:nvCxnSpPr>
+          <p:spPr>
+            <a:xfrm flipH="1" flipV="1">
+              <a:off x="1772816" y="3198350"/>
+              <a:ext cx="0" cy="2423160"/>
+            </a:xfrm>
+            <a:prstGeom prst="line">
+              <a:avLst/>
+            </a:prstGeom>
+            <a:ln w="19050">
+              <a:solidFill>
+                <a:schemeClr val="tx1"/>
+              </a:solidFill>
+            </a:ln>
+          </p:spPr>
+          <p:style>
+            <a:lnRef idx="1">
+              <a:schemeClr val="accent1"/>
+            </a:lnRef>
+            <a:fillRef idx="0">
+              <a:schemeClr val="accent1"/>
+            </a:fillRef>
+            <a:effectRef idx="0">
+              <a:schemeClr val="accent1"/>
+            </a:effectRef>
+            <a:fontRef idx="minor">
+              <a:schemeClr val="tx1"/>
+            </a:fontRef>
+          </p:style>
+        </p:cxnSp>
+        <p:cxnSp>
+          <p:nvCxnSpPr>
+            <p:cNvPr id="54" name="Straight Connector 53"/>
+            <p:cNvCxnSpPr>
+              <a:cxnSpLocks/>
+              <a:endCxn id="53" idx="3"/>
+            </p:cNvCxnSpPr>
+            <p:nvPr/>
+          </p:nvCxnSpPr>
+          <p:spPr>
+            <a:xfrm flipH="1">
+              <a:off x="1759249" y="3897619"/>
+              <a:ext cx="450490" cy="0"/>
+            </a:xfrm>
+            <a:prstGeom prst="line">
+              <a:avLst/>
+            </a:prstGeom>
+            <a:ln w="19050">
+              <a:solidFill>
+                <a:schemeClr val="tx1"/>
+              </a:solidFill>
+            </a:ln>
+          </p:spPr>
+          <p:style>
+            <a:lnRef idx="1">
+              <a:schemeClr val="accent1"/>
+            </a:lnRef>
+            <a:fillRef idx="0">
+              <a:schemeClr val="accent1"/>
+            </a:fillRef>
+            <a:effectRef idx="0">
+              <a:schemeClr val="accent1"/>
+            </a:effectRef>
+            <a:fontRef idx="minor">
+              <a:schemeClr val="tx1"/>
+            </a:fontRef>
+          </p:style>
+        </p:cxnSp>
+        <p:sp>
+          <p:nvSpPr>
+            <p:cNvPr id="55" name="TextBox 54"/>
+            <p:cNvSpPr txBox="1"/>
+            <p:nvPr/>
+          </p:nvSpPr>
+          <p:spPr>
+            <a:xfrm>
+              <a:off x="322858" y="1657670"/>
+              <a:ext cx="1919372" cy="276999"/>
+            </a:xfrm>
+            <a:prstGeom prst="rect">
+              <a:avLst/>
+            </a:prstGeom>
+            <a:noFill/>
+          </p:spPr>
+          <p:txBody>
+            <a:bodyPr wrap="none" rtlCol="0">
+              <a:spAutoFit/>
+            </a:bodyPr>
+            <a:lstStyle/>
+            <a:p>
+              <a:r>
+                <a:rPr lang="en-US" sz="1200" dirty="0"/>
+                <a:t>Apply SW and GW irrigation</a:t>
+              </a:r>
+            </a:p>
+          </p:txBody>
+        </p:sp>
+        <p:sp>
+          <p:nvSpPr>
+            <p:cNvPr id="49" name="TextBox 48"/>
+            <p:cNvSpPr txBox="1"/>
+            <p:nvPr/>
+          </p:nvSpPr>
+          <p:spPr>
+            <a:xfrm>
+              <a:off x="792413" y="5478293"/>
+              <a:ext cx="974241" cy="276999"/>
+            </a:xfrm>
+            <a:prstGeom prst="rect">
+              <a:avLst/>
+            </a:prstGeom>
+            <a:noFill/>
+          </p:spPr>
+          <p:txBody>
+            <a:bodyPr wrap="none" rtlCol="0">
+              <a:spAutoFit/>
+            </a:bodyPr>
+            <a:lstStyle/>
+            <a:p>
+              <a:r>
+                <a:rPr lang="en-US" sz="1200" dirty="0"/>
+                <a:t>Pumped GW</a:t>
+              </a:r>
+            </a:p>
+          </p:txBody>
+        </p:sp>
+        <p:cxnSp>
+          <p:nvCxnSpPr>
+            <p:cNvPr id="51" name="Straight Arrow Connector 50"/>
+            <p:cNvCxnSpPr/>
+            <p:nvPr/>
+          </p:nvCxnSpPr>
+          <p:spPr>
+            <a:xfrm>
+              <a:off x="3417668" y="1478574"/>
+              <a:ext cx="0" cy="304371"/>
+            </a:xfrm>
+            <a:prstGeom prst="straightConnector1">
+              <a:avLst/>
+            </a:prstGeom>
+            <a:ln w="19050">
+              <a:solidFill>
+                <a:schemeClr val="tx1"/>
+              </a:solidFill>
+              <a:headEnd type="none" w="med" len="med"/>
+              <a:tailEnd type="triangle" w="med" len="med"/>
+            </a:ln>
+          </p:spPr>
+          <p:style>
+            <a:lnRef idx="1">
+              <a:schemeClr val="accent1"/>
+            </a:lnRef>
+            <a:fillRef idx="0">
+              <a:schemeClr val="accent1"/>
+            </a:fillRef>
+            <a:effectRef idx="0">
+              <a:schemeClr val="accent1"/>
+            </a:effectRef>
+            <a:fontRef idx="minor">
+              <a:schemeClr val="tx1"/>
+            </a:fontRef>
+          </p:style>
+        </p:cxnSp>
+        <p:sp>
+          <p:nvSpPr>
+            <p:cNvPr id="3" name="Rectangle 2"/>
+            <p:cNvSpPr/>
+            <p:nvPr/>
+          </p:nvSpPr>
+          <p:spPr>
+            <a:xfrm>
+              <a:off x="2165414" y="1009750"/>
+              <a:ext cx="2551767" cy="461665"/>
+            </a:xfrm>
+            <a:prstGeom prst="rect">
+              <a:avLst/>
+            </a:prstGeom>
+          </p:spPr>
+          <p:txBody>
+            <a:bodyPr wrap="square">
+              <a:spAutoFit/>
+            </a:bodyPr>
+            <a:lstStyle/>
+            <a:p>
+              <a:pPr algn="ctr"/>
+              <a:r>
+                <a:rPr lang="en-US" sz="1200" dirty="0"/>
+                <a:t>Externally (UZF) or internally (PRMS) calculated </a:t>
+              </a:r>
+              <a:r>
+                <a:rPr lang="en-US" sz="1200" dirty="0" err="1"/>
+                <a:t>ET</a:t>
+              </a:r>
+              <a:r>
+                <a:rPr lang="en-US" sz="1200" baseline="-25000" dirty="0" err="1"/>
+                <a:t>d</a:t>
+              </a:r>
+              <a:endParaRPr lang="en-US" sz="1200" baseline="-25000" dirty="0"/>
+            </a:p>
+          </p:txBody>
+        </p:sp>
+        <p:sp>
+          <p:nvSpPr>
+            <p:cNvPr id="52" name="Rectangle 51"/>
+            <p:cNvSpPr/>
+            <p:nvPr/>
+          </p:nvSpPr>
+          <p:spPr>
+            <a:xfrm>
+              <a:off x="2249760" y="992347"/>
+              <a:ext cx="2354568" cy="479068"/>
+            </a:xfrm>
+            <a:prstGeom prst="rect">
+              <a:avLst/>
+            </a:prstGeom>
+            <a:noFill/>
+            <a:ln>
+              <a:solidFill>
+                <a:schemeClr val="tx1"/>
+              </a:solidFill>
+            </a:ln>
+          </p:spPr>
+          <p:style>
+            <a:lnRef idx="2">
+              <a:schemeClr val="accent1">
+                <a:shade val="50000"/>
+              </a:schemeClr>
+            </a:lnRef>
+            <a:fillRef idx="1">
+              <a:schemeClr val="accent1"/>
+            </a:fillRef>
+            <a:effectRef idx="0">
+              <a:schemeClr val="accent1"/>
+            </a:effectRef>
+            <a:fontRef idx="minor">
+              <a:schemeClr val="lt1"/>
+            </a:fontRef>
+          </p:style>
+          <p:txBody>
+            <a:bodyPr rtlCol="0" anchor="ctr"/>
+            <a:lstStyle/>
+            <a:p>
+              <a:pPr algn="ctr"/>
+              <a:endParaRPr lang="en-US"/>
+            </a:p>
+          </p:txBody>
+        </p:sp>
+        <p:sp>
+          <p:nvSpPr>
+            <p:cNvPr id="53" name="TextBox 52"/>
+            <p:cNvSpPr txBox="1"/>
+            <p:nvPr/>
+          </p:nvSpPr>
+          <p:spPr>
+            <a:xfrm>
+              <a:off x="799819" y="3768699"/>
+              <a:ext cx="959430" cy="276999"/>
+            </a:xfrm>
+            <a:prstGeom prst="rect">
+              <a:avLst/>
+            </a:prstGeom>
+            <a:noFill/>
+          </p:spPr>
+          <p:txBody>
+            <a:bodyPr wrap="none" rtlCol="0">
+              <a:spAutoFit/>
+            </a:bodyPr>
+            <a:lstStyle/>
+            <a:p>
+              <a:r>
+                <a:rPr lang="en-US" sz="1200" dirty="0"/>
+                <a:t>Diverted SW</a:t>
+              </a:r>
+            </a:p>
+          </p:txBody>
+        </p:sp>
+        <p:sp>
+          <p:nvSpPr>
+            <p:cNvPr id="56" name="TextBox 55"/>
+            <p:cNvSpPr txBox="1"/>
+            <p:nvPr/>
+          </p:nvSpPr>
+          <p:spPr>
+            <a:xfrm>
+              <a:off x="1402044" y="2712376"/>
+              <a:ext cx="940725" cy="461665"/>
+            </a:xfrm>
+            <a:prstGeom prst="rect">
+              <a:avLst/>
+            </a:prstGeom>
+            <a:noFill/>
+          </p:spPr>
+          <p:txBody>
+            <a:bodyPr wrap="square" rtlCol="0">
+              <a:spAutoFit/>
+            </a:bodyPr>
+            <a:lstStyle/>
+            <a:p>
+              <a:r>
+                <a:rPr lang="en-US" sz="1200" dirty="0"/>
+                <a:t>Nonlinear iterations</a:t>
+              </a:r>
+            </a:p>
+          </p:txBody>
+        </p:sp>
+        <p:cxnSp>
+          <p:nvCxnSpPr>
+            <p:cNvPr id="57" name="Straight Connector 56"/>
+            <p:cNvCxnSpPr>
+              <a:cxnSpLocks/>
+            </p:cNvCxnSpPr>
+            <p:nvPr/>
+          </p:nvCxnSpPr>
+          <p:spPr>
+            <a:xfrm flipH="1" flipV="1">
+              <a:off x="1782147" y="1966846"/>
+              <a:ext cx="0" cy="772320"/>
+            </a:xfrm>
+            <a:prstGeom prst="line">
+              <a:avLst/>
+            </a:prstGeom>
+            <a:ln w="19050">
+              <a:solidFill>
+                <a:schemeClr val="tx1"/>
+              </a:solidFill>
+            </a:ln>
+          </p:spPr>
+          <p:style>
+            <a:lnRef idx="1">
+              <a:schemeClr val="accent1"/>
+            </a:lnRef>
+            <a:fillRef idx="0">
+              <a:schemeClr val="accent1"/>
+            </a:fillRef>
+            <a:effectRef idx="0">
+              <a:schemeClr val="accent1"/>
+            </a:effectRef>
+            <a:fontRef idx="minor">
+              <a:schemeClr val="tx1"/>
+            </a:fontRef>
+          </p:style>
+        </p:cxnSp>
+        <p:sp>
+          <p:nvSpPr>
+            <p:cNvPr id="59" name="TextBox 58"/>
+            <p:cNvSpPr txBox="1"/>
+            <p:nvPr/>
+          </p:nvSpPr>
+          <p:spPr>
+            <a:xfrm>
+              <a:off x="4294522" y="1752258"/>
+              <a:ext cx="2397980" cy="461665"/>
+            </a:xfrm>
+            <a:prstGeom prst="rect">
+              <a:avLst/>
+            </a:prstGeom>
+            <a:noFill/>
+          </p:spPr>
+          <p:txBody>
+            <a:bodyPr wrap="square" rtlCol="0">
+              <a:spAutoFit/>
+            </a:bodyPr>
+            <a:lstStyle/>
+            <a:p>
+              <a:pPr algn="ctr"/>
+              <a:r>
+                <a:rPr lang="en-US" sz="1200" dirty="0"/>
+                <a:t>Return flows (SW+GW) calculated by UZF/PRMS</a:t>
+              </a:r>
+            </a:p>
+          </p:txBody>
+        </p:sp>
+        <p:sp>
+          <p:nvSpPr>
+            <p:cNvPr id="60" name="Rectangle 59"/>
+            <p:cNvSpPr/>
+            <p:nvPr/>
+          </p:nvSpPr>
+          <p:spPr>
+            <a:xfrm>
+              <a:off x="4373934" y="1755206"/>
+              <a:ext cx="2217264" cy="423281"/>
+            </a:xfrm>
+            <a:prstGeom prst="rect">
+              <a:avLst/>
+            </a:prstGeom>
+            <a:noFill/>
+            <a:ln>
+              <a:solidFill>
+                <a:schemeClr val="tx1"/>
+              </a:solidFill>
+            </a:ln>
+          </p:spPr>
+          <p:style>
+            <a:lnRef idx="2">
+              <a:schemeClr val="accent1">
+                <a:shade val="50000"/>
+              </a:schemeClr>
+            </a:lnRef>
+            <a:fillRef idx="1">
+              <a:schemeClr val="accent1"/>
+            </a:fillRef>
+            <a:effectRef idx="0">
+              <a:schemeClr val="accent1"/>
+            </a:effectRef>
+            <a:fontRef idx="minor">
+              <a:schemeClr val="lt1"/>
+            </a:fontRef>
+          </p:style>
+          <p:txBody>
+            <a:bodyPr rtlCol="0" anchor="ctr"/>
+            <a:lstStyle/>
+            <a:p>
+              <a:pPr algn="ctr"/>
+              <a:endParaRPr lang="en-US"/>
+            </a:p>
+          </p:txBody>
+        </p:sp>
+        <p:cxnSp>
+          <p:nvCxnSpPr>
+            <p:cNvPr id="61" name="Straight Arrow Connector 60"/>
+            <p:cNvCxnSpPr/>
+            <p:nvPr/>
+          </p:nvCxnSpPr>
+          <p:spPr>
+            <a:xfrm>
+              <a:off x="4083713" y="1970941"/>
+              <a:ext cx="296623" cy="0"/>
+            </a:xfrm>
+            <a:prstGeom prst="straightConnector1">
+              <a:avLst/>
+            </a:prstGeom>
+            <a:ln w="19050">
+              <a:solidFill>
+                <a:schemeClr val="tx1"/>
+              </a:solidFill>
+              <a:tailEnd type="triangle"/>
+            </a:ln>
+          </p:spPr>
+          <p:style>
+            <a:lnRef idx="1">
+              <a:schemeClr val="accent1"/>
+            </a:lnRef>
+            <a:fillRef idx="0">
+              <a:schemeClr val="accent1"/>
+            </a:fillRef>
+            <a:effectRef idx="0">
+              <a:schemeClr val="accent1"/>
+            </a:effectRef>
+            <a:fontRef idx="minor">
+              <a:schemeClr val="tx1"/>
+            </a:fontRef>
+          </p:style>
+        </p:cxnSp>
+        <p:sp>
+          <p:nvSpPr>
+            <p:cNvPr id="63" name="Rectangle 62"/>
+            <p:cNvSpPr/>
+            <p:nvPr/>
+          </p:nvSpPr>
+          <p:spPr>
+            <a:xfrm>
+              <a:off x="4083713" y="3069759"/>
+              <a:ext cx="2180502" cy="276999"/>
+            </a:xfrm>
+            <a:prstGeom prst="rect">
+              <a:avLst/>
+            </a:prstGeom>
+            <a:noFill/>
+            <a:ln>
+              <a:solidFill>
+                <a:schemeClr val="tx1"/>
+              </a:solidFill>
+            </a:ln>
+          </p:spPr>
+          <p:style>
+            <a:lnRef idx="2">
+              <a:schemeClr val="accent1">
+                <a:shade val="50000"/>
+              </a:schemeClr>
+            </a:lnRef>
+            <a:fillRef idx="1">
+              <a:schemeClr val="accent1"/>
+            </a:fillRef>
+            <a:effectRef idx="0">
+              <a:schemeClr val="accent1"/>
+            </a:effectRef>
+            <a:fontRef idx="minor">
+              <a:schemeClr val="lt1"/>
+            </a:fontRef>
+          </p:style>
+          <p:txBody>
+            <a:bodyPr rtlCol="0" anchor="ctr"/>
+            <a:lstStyle/>
+            <a:p>
+              <a:pPr algn="ctr"/>
+              <a:endParaRPr lang="en-US"/>
+            </a:p>
+          </p:txBody>
+        </p:sp>
+        <p:sp>
+          <p:nvSpPr>
+            <p:cNvPr id="64" name="TextBox 63"/>
+            <p:cNvSpPr txBox="1"/>
+            <p:nvPr/>
+          </p:nvSpPr>
+          <p:spPr>
+            <a:xfrm>
+              <a:off x="3840436" y="3085776"/>
+              <a:ext cx="2663007" cy="276999"/>
+            </a:xfrm>
+            <a:prstGeom prst="rect">
+              <a:avLst/>
+            </a:prstGeom>
+            <a:noFill/>
+          </p:spPr>
+          <p:txBody>
+            <a:bodyPr wrap="square" rtlCol="0">
+              <a:spAutoFit/>
+            </a:bodyPr>
+            <a:lstStyle/>
+            <a:p>
+              <a:pPr algn="ctr"/>
+              <a:r>
+                <a:rPr lang="en-US" sz="1200" dirty="0"/>
+                <a:t>GW pumping rate set in AG input</a:t>
+              </a:r>
+            </a:p>
+          </p:txBody>
+        </p:sp>
+        <p:sp>
+          <p:nvSpPr>
+            <p:cNvPr id="66" name="Rectangle 65"/>
+            <p:cNvSpPr/>
+            <p:nvPr/>
+          </p:nvSpPr>
+          <p:spPr>
+            <a:xfrm>
+              <a:off x="2292931" y="5361300"/>
+              <a:ext cx="2286000" cy="393992"/>
+            </a:xfrm>
+            <a:prstGeom prst="rect">
+              <a:avLst/>
+            </a:prstGeom>
+            <a:noFill/>
+            <a:ln>
+              <a:solidFill>
+                <a:schemeClr val="tx1"/>
+              </a:solidFill>
+            </a:ln>
+          </p:spPr>
+          <p:style>
+            <a:lnRef idx="2">
+              <a:schemeClr val="accent1">
+                <a:shade val="50000"/>
+              </a:schemeClr>
+            </a:lnRef>
+            <a:fillRef idx="1">
+              <a:schemeClr val="accent1"/>
+            </a:fillRef>
+            <a:effectRef idx="0">
+              <a:schemeClr val="accent1"/>
+            </a:effectRef>
+            <a:fontRef idx="minor">
+              <a:schemeClr val="lt1"/>
+            </a:fontRef>
+          </p:style>
+          <p:txBody>
+            <a:bodyPr rtlCol="0" anchor="ctr"/>
+            <a:lstStyle/>
+            <a:p>
+              <a:pPr algn="ctr"/>
+              <a:endParaRPr lang="en-US"/>
+            </a:p>
+          </p:txBody>
+        </p:sp>
+        <p:sp>
+          <p:nvSpPr>
+            <p:cNvPr id="67" name="TextBox 66"/>
+            <p:cNvSpPr txBox="1"/>
+            <p:nvPr/>
+          </p:nvSpPr>
+          <p:spPr>
+            <a:xfrm>
+              <a:off x="2136471" y="5342634"/>
+              <a:ext cx="2661651" cy="677108"/>
+            </a:xfrm>
+            <a:prstGeom prst="rect">
+              <a:avLst/>
+            </a:prstGeom>
+            <a:noFill/>
+          </p:spPr>
+          <p:txBody>
+            <a:bodyPr wrap="square" rtlCol="0">
+              <a:spAutoFit/>
+            </a:bodyPr>
+            <a:lstStyle/>
+            <a:p>
+              <a:pPr algn="ctr"/>
+              <a:r>
+                <a:rPr lang="en-US" sz="1200" dirty="0"/>
+                <a:t>GW irrigation</a:t>
+              </a:r>
+            </a:p>
+            <a:p>
+              <a:pPr algn="ctr"/>
+              <a:r>
+                <a:rPr lang="en-US" sz="1200" dirty="0"/>
+                <a:t>(IRRIGATIONWELL</a:t>
+              </a:r>
+              <a:r>
+                <a:rPr lang="en-US" sz="1000" dirty="0"/>
+                <a:t>)</a:t>
+              </a:r>
+            </a:p>
+            <a:p>
+              <a:pPr algn="ctr"/>
+              <a:endParaRPr lang="en-US" sz="1400" dirty="0"/>
+            </a:p>
+          </p:txBody>
+        </p:sp>
+        <p:sp>
+          <p:nvSpPr>
+            <p:cNvPr id="69" name="Rectangle 68"/>
+            <p:cNvSpPr/>
+            <p:nvPr/>
+          </p:nvSpPr>
+          <p:spPr>
+            <a:xfrm>
+              <a:off x="2283600" y="4654877"/>
+              <a:ext cx="2286000" cy="432514"/>
+            </a:xfrm>
+            <a:prstGeom prst="rect">
+              <a:avLst/>
+            </a:prstGeom>
+            <a:noFill/>
+            <a:ln>
+              <a:solidFill>
+                <a:schemeClr val="tx1"/>
+              </a:solidFill>
+            </a:ln>
+          </p:spPr>
+          <p:style>
+            <a:lnRef idx="2">
+              <a:schemeClr val="accent1">
+                <a:shade val="50000"/>
+              </a:schemeClr>
+            </a:lnRef>
+            <a:fillRef idx="1">
+              <a:schemeClr val="accent1"/>
+            </a:fillRef>
+            <a:effectRef idx="0">
+              <a:schemeClr val="accent1"/>
+            </a:effectRef>
+            <a:fontRef idx="minor">
+              <a:schemeClr val="lt1"/>
+            </a:fontRef>
+          </p:style>
+          <p:txBody>
+            <a:bodyPr rtlCol="0" anchor="ctr"/>
+            <a:lstStyle/>
+            <a:p>
+              <a:pPr algn="ctr"/>
+              <a:endParaRPr lang="en-US"/>
+            </a:p>
+          </p:txBody>
+        </p:sp>
+        <p:sp>
+          <p:nvSpPr>
+            <p:cNvPr id="70" name="TextBox 69"/>
+            <p:cNvSpPr txBox="1"/>
+            <p:nvPr/>
+          </p:nvSpPr>
+          <p:spPr>
+            <a:xfrm>
+              <a:off x="2299863" y="4664092"/>
+              <a:ext cx="2300558" cy="461665"/>
+            </a:xfrm>
+            <a:prstGeom prst="rect">
+              <a:avLst/>
+            </a:prstGeom>
+            <a:noFill/>
+          </p:spPr>
+          <p:txBody>
+            <a:bodyPr wrap="square" rtlCol="0">
+              <a:spAutoFit/>
+            </a:bodyPr>
+            <a:lstStyle/>
+            <a:p>
+              <a:pPr algn="ctr"/>
+              <a:r>
+                <a:rPr lang="en-US" sz="1200" dirty="0"/>
+                <a:t>GW Demand set as SW shortfall</a:t>
+              </a:r>
+            </a:p>
+            <a:p>
+              <a:pPr algn="ctr"/>
+              <a:r>
+                <a:rPr lang="en-US" sz="1200" dirty="0"/>
+                <a:t>(SUPPLEMENTALWELL)</a:t>
+              </a:r>
+            </a:p>
+          </p:txBody>
+        </p:sp>
+        <p:cxnSp>
+          <p:nvCxnSpPr>
+            <p:cNvPr id="71" name="Straight Arrow Connector 70"/>
+            <p:cNvCxnSpPr/>
+            <p:nvPr/>
+          </p:nvCxnSpPr>
+          <p:spPr>
+            <a:xfrm>
+              <a:off x="3441639" y="5087391"/>
+              <a:ext cx="0" cy="304371"/>
+            </a:xfrm>
+            <a:prstGeom prst="straightConnector1">
+              <a:avLst/>
+            </a:prstGeom>
+            <a:ln w="19050">
+              <a:solidFill>
+                <a:schemeClr val="tx1"/>
+              </a:solidFill>
+              <a:headEnd type="none" w="med" len="med"/>
+              <a:tailEnd type="triangle" w="med" len="med"/>
+            </a:ln>
+          </p:spPr>
+          <p:style>
+            <a:lnRef idx="1">
+              <a:schemeClr val="accent1"/>
+            </a:lnRef>
+            <a:fillRef idx="0">
+              <a:schemeClr val="accent1"/>
+            </a:fillRef>
+            <a:effectRef idx="0">
+              <a:schemeClr val="accent1"/>
+            </a:effectRef>
+            <a:fontRef idx="minor">
+              <a:schemeClr val="tx1"/>
+            </a:fontRef>
+          </p:style>
+        </p:cxnSp>
+        <p:cxnSp>
+          <p:nvCxnSpPr>
+            <p:cNvPr id="74" name="Straight Arrow Connector 73"/>
+            <p:cNvCxnSpPr>
+              <a:cxnSpLocks/>
+              <a:endCxn id="63" idx="1"/>
+            </p:cNvCxnSpPr>
+            <p:nvPr/>
+          </p:nvCxnSpPr>
+          <p:spPr>
+            <a:xfrm flipV="1">
+              <a:off x="3441297" y="3208259"/>
+              <a:ext cx="642416" cy="2912"/>
+            </a:xfrm>
+            <a:prstGeom prst="straightConnector1">
+              <a:avLst/>
+            </a:prstGeom>
+            <a:ln w="19050">
+              <a:solidFill>
+                <a:schemeClr val="tx1"/>
+              </a:solidFill>
+              <a:tailEnd type="triangle"/>
+            </a:ln>
+          </p:spPr>
+          <p:style>
+            <a:lnRef idx="1">
+              <a:schemeClr val="accent1"/>
+            </a:lnRef>
+            <a:fillRef idx="0">
+              <a:schemeClr val="accent1"/>
+            </a:fillRef>
+            <a:effectRef idx="0">
+              <a:schemeClr val="accent1"/>
+            </a:effectRef>
+            <a:fontRef idx="minor">
+              <a:schemeClr val="tx1"/>
+            </a:fontRef>
+          </p:style>
+        </p:cxnSp>
+        <p:sp>
+          <p:nvSpPr>
+            <p:cNvPr id="75" name="TextBox 74"/>
+            <p:cNvSpPr txBox="1"/>
+            <p:nvPr/>
+          </p:nvSpPr>
+          <p:spPr>
+            <a:xfrm>
+              <a:off x="3441297" y="2958604"/>
+              <a:ext cx="1098721" cy="276999"/>
+            </a:xfrm>
+            <a:prstGeom prst="rect">
+              <a:avLst/>
+            </a:prstGeom>
+            <a:noFill/>
+          </p:spPr>
+          <p:txBody>
+            <a:bodyPr wrap="square" rtlCol="0">
+              <a:spAutoFit/>
+            </a:bodyPr>
+            <a:lstStyle/>
+            <a:p>
+              <a:r>
+                <a:rPr lang="en-US" sz="1200" dirty="0"/>
+                <a:t>No SW</a:t>
+              </a:r>
+            </a:p>
+          </p:txBody>
+        </p:sp>
+        <p:sp>
+          <p:nvSpPr>
+            <p:cNvPr id="43" name="TextBox 42"/>
+            <p:cNvSpPr txBox="1"/>
+            <p:nvPr/>
+          </p:nvSpPr>
+          <p:spPr>
+            <a:xfrm>
+              <a:off x="3408382" y="3186580"/>
+              <a:ext cx="1060251" cy="276999"/>
+            </a:xfrm>
+            <a:prstGeom prst="rect">
+              <a:avLst/>
+            </a:prstGeom>
+            <a:noFill/>
+          </p:spPr>
+          <p:txBody>
+            <a:bodyPr wrap="square" rtlCol="0">
+              <a:spAutoFit/>
+            </a:bodyPr>
+            <a:lstStyle/>
+            <a:p>
+              <a:r>
+                <a:rPr lang="en-US" sz="1200" dirty="0"/>
+                <a:t>GW right</a:t>
+              </a:r>
+            </a:p>
+          </p:txBody>
+        </p:sp>
+        <p:cxnSp>
+          <p:nvCxnSpPr>
+            <p:cNvPr id="44" name="Straight Arrow Connector 43">
+              <a:extLst>
+                <a:ext uri="{FF2B5EF4-FFF2-40B4-BE49-F238E27FC236}">
+                  <a16:creationId xmlns:a16="http://schemas.microsoft.com/office/drawing/2014/main" id="{32E85642-8101-4372-8CE3-707908B4BD9F}"/>
+                </a:ext>
+              </a:extLst>
+            </p:cNvPr>
+            <p:cNvCxnSpPr>
+              <a:cxnSpLocks/>
+            </p:cNvCxnSpPr>
+            <p:nvPr/>
+          </p:nvCxnSpPr>
+          <p:spPr>
+            <a:xfrm flipV="1">
+              <a:off x="1782147" y="1970941"/>
+              <a:ext cx="968873" cy="5935"/>
+            </a:xfrm>
+            <a:prstGeom prst="straightConnector1">
+              <a:avLst/>
+            </a:prstGeom>
+            <a:ln w="19050">
+              <a:solidFill>
+                <a:schemeClr val="tx1"/>
+              </a:solidFill>
+              <a:tailEnd type="triangle"/>
+            </a:ln>
+          </p:spPr>
+          <p:style>
+            <a:lnRef idx="1">
+              <a:schemeClr val="accent1"/>
+            </a:lnRef>
+            <a:fillRef idx="0">
+              <a:schemeClr val="accent1"/>
+            </a:fillRef>
+            <a:effectRef idx="0">
+              <a:schemeClr val="accent1"/>
+            </a:effectRef>
+            <a:fontRef idx="minor">
+              <a:schemeClr val="tx1"/>
+            </a:fontRef>
+          </p:style>
+        </p:cxnSp>
       </p:grpSp>
-      <p:sp>
-        <p:nvSpPr>
-          <p:cNvPr id="37" name="Rectangle 36"/>
+    </p:spTree>
+    <p:extLst>
+      <p:ext uri="{BB962C8B-B14F-4D97-AF65-F5344CB8AC3E}">
+        <p14:creationId xmlns:p14="http://schemas.microsoft.com/office/powerpoint/2010/main" val="1970704118"/>
+      </p:ext>
+    </p:extLst>
+  </p:cSld>
+  <p:clrMapOvr>
+    <a:masterClrMapping/>
+  </p:clrMapOvr>
+</p:sld>
+</file>
+
+<file path=ppt/slides/slide5.xml><?xml version="1.0" encoding="utf-8"?>
+<p:sld xmlns:a="http://schemas.openxmlformats.org/drawingml/2006/main" xmlns:r="http://schemas.openxmlformats.org/officeDocument/2006/relationships" xmlns:p="http://schemas.openxmlformats.org/presentationml/2006/main">
+  <p:cSld>
+    <p:spTree>
+      <p:nvGrpSpPr>
+        <p:cNvPr id="1" name=""/>
+        <p:cNvGrpSpPr/>
+        <p:nvPr/>
+      </p:nvGrpSpPr>
+      <p:grpSpPr>
+        <a:xfrm>
+          <a:off x="0" y="0"/>
+          <a:ext cx="0" cy="0"/>
+          <a:chOff x="0" y="0"/>
+          <a:chExt cx="0" cy="0"/>
+        </a:xfrm>
+      </p:grpSpPr>
+      <p:sp>
+        <p:nvSpPr>
+          <p:cNvPr id="42" name="Rectangle 41">
+            <a:extLst>
+              <a:ext uri="{FF2B5EF4-FFF2-40B4-BE49-F238E27FC236}">
+                <a16:creationId xmlns:a16="http://schemas.microsoft.com/office/drawing/2014/main" id="{7FC906BE-548D-4EA4-B5FD-2CB4322D7307}"/>
+              </a:ext>
+            </a:extLst>
+          </p:cNvPr>
           <p:cNvSpPr/>
           <p:nvPr/>
         </p:nvSpPr>
         <p:spPr>
           <a:xfrm>
-            <a:off x="2584009" y="1856334"/>
-            <a:ext cx="1723696" cy="765663"/>
+            <a:off x="2202207" y="3474438"/>
+            <a:ext cx="2495871" cy="859220"/>
           </a:xfrm>
           <a:prstGeom prst="rect">
             <a:avLst/>
@@ -5603,14 +6738,20 @@
       </p:sp>
       <p:sp>
         <p:nvSpPr>
-          <p:cNvPr id="40" name="TextBox 39"/>
+          <p:cNvPr id="43" name="TextBox 42">
+            <a:extLst>
+              <a:ext uri="{FF2B5EF4-FFF2-40B4-BE49-F238E27FC236}">
+                <a16:creationId xmlns:a16="http://schemas.microsoft.com/office/drawing/2014/main" id="{27CCA8D3-B94A-45C8-989B-CCE30FD6C04F}"/>
+              </a:ext>
+            </a:extLst>
+          </p:cNvPr>
           <p:cNvSpPr txBox="1"/>
           <p:nvPr/>
         </p:nvSpPr>
         <p:spPr>
           <a:xfrm>
-            <a:off x="2594378" y="1971528"/>
-            <a:ext cx="1723696" cy="523220"/>
+            <a:off x="2136654" y="3481324"/>
+            <a:ext cx="2561424" cy="830997"/>
           </a:xfrm>
           <a:prstGeom prst="rect">
             <a:avLst/>
@@ -5625,25 +6766,323 @@
           <a:p>
             <a:pPr algn="ctr"/>
             <a:r>
-              <a:rPr lang="en-US" sz="1400" dirty="0" err="1"/>
-              <a:t>ETa</a:t>
-            </a:r>
-            <a:r>
-              <a:rPr lang="en-US" sz="1400" dirty="0"/>
-              <a:t> is calculated by UZF/PRMS</a:t>
+              <a:rPr lang="en-US" sz="1200" dirty="0"/>
+              <a:t>SW diversion set as Irrigation demand, and limited by available flow and water right</a:t>
+            </a:r>
+          </a:p>
+          <a:p>
+            <a:pPr algn="ctr"/>
+            <a:r>
+              <a:rPr lang="en-US" sz="1200" dirty="0"/>
+              <a:t>(IRRIGATIONDIVERSION)</a:t>
+            </a:r>
+          </a:p>
+        </p:txBody>
+      </p:sp>
+      <p:sp>
+        <p:nvSpPr>
+          <p:cNvPr id="44" name="TextBox 43">
+            <a:extLst>
+              <a:ext uri="{FF2B5EF4-FFF2-40B4-BE49-F238E27FC236}">
+                <a16:creationId xmlns:a16="http://schemas.microsoft.com/office/drawing/2014/main" id="{B59AE967-289F-4341-B168-0B0B6D19F56F}"/>
+              </a:ext>
+            </a:extLst>
+          </p:cNvPr>
+          <p:cNvSpPr txBox="1"/>
+          <p:nvPr/>
+        </p:nvSpPr>
+        <p:spPr>
+          <a:xfrm>
+            <a:off x="277319" y="162113"/>
+            <a:ext cx="4572001" cy="646331"/>
+          </a:xfrm>
+          <a:prstGeom prst="rect">
+            <a:avLst/>
+          </a:prstGeom>
+          <a:noFill/>
+        </p:spPr>
+        <p:txBody>
+          <a:bodyPr wrap="square" rtlCol="0">
+            <a:spAutoFit/>
+          </a:bodyPr>
+          <a:lstStyle/>
+          <a:p>
+            <a:r>
+              <a:rPr lang="en-US" sz="1200" dirty="0"/>
+              <a:t>C) Surface water (SW) and groundwater (GW) irrigation using IRRIGATION_SFR and IRRIGATION_WELL; demand calculated as ET deficit using ETDEMAND.</a:t>
             </a:r>
           </a:p>
         </p:txBody>
       </p:sp>
       <p:cxnSp>
         <p:nvCxnSpPr>
-          <p:cNvPr id="41" name="Straight Arrow Connector 40"/>
+          <p:cNvPr id="45" name="Straight Arrow Connector 44">
+            <a:extLst>
+              <a:ext uri="{FF2B5EF4-FFF2-40B4-BE49-F238E27FC236}">
+                <a16:creationId xmlns:a16="http://schemas.microsoft.com/office/drawing/2014/main" id="{9873F82D-AA51-430F-8540-09F1FA55B55F}"/>
+              </a:ext>
+            </a:extLst>
+          </p:cNvPr>
+          <p:cNvCxnSpPr>
+            <a:cxnSpLocks/>
+            <a:endCxn id="72" idx="0"/>
+          </p:cNvCxnSpPr>
+          <p:nvPr/>
+        </p:nvCxnSpPr>
+        <p:spPr>
+          <a:xfrm>
+            <a:off x="3441639" y="4333658"/>
+            <a:ext cx="0" cy="330434"/>
+          </a:xfrm>
+          <a:prstGeom prst="straightConnector1">
+            <a:avLst/>
+          </a:prstGeom>
+          <a:ln w="19050">
+            <a:solidFill>
+              <a:schemeClr val="tx1"/>
+            </a:solidFill>
+            <a:headEnd type="none" w="med" len="med"/>
+            <a:tailEnd type="triangle" w="med" len="med"/>
+          </a:ln>
+        </p:spPr>
+        <p:style>
+          <a:lnRef idx="1">
+            <a:schemeClr val="accent1"/>
+          </a:lnRef>
+          <a:fillRef idx="0">
+            <a:schemeClr val="accent1"/>
+          </a:fillRef>
+          <a:effectRef idx="0">
+            <a:schemeClr val="accent1"/>
+          </a:effectRef>
+          <a:fontRef idx="minor">
+            <a:schemeClr val="tx1"/>
+          </a:fontRef>
+        </p:style>
+      </p:cxnSp>
+      <p:sp>
+        <p:nvSpPr>
+          <p:cNvPr id="46" name="Rectangle 45">
+            <a:extLst>
+              <a:ext uri="{FF2B5EF4-FFF2-40B4-BE49-F238E27FC236}">
+                <a16:creationId xmlns:a16="http://schemas.microsoft.com/office/drawing/2014/main" id="{5832A55A-C009-4499-AE86-5AD0E0E98968}"/>
+              </a:ext>
+            </a:extLst>
+          </p:cNvPr>
+          <p:cNvSpPr/>
+          <p:nvPr/>
+        </p:nvSpPr>
+        <p:spPr>
+          <a:xfrm>
+            <a:off x="2353070" y="2393321"/>
+            <a:ext cx="2203857" cy="618040"/>
+          </a:xfrm>
+          <a:prstGeom prst="rect">
+            <a:avLst/>
+          </a:prstGeom>
+          <a:noFill/>
+          <a:ln>
+            <a:solidFill>
+              <a:schemeClr val="tx1"/>
+            </a:solidFill>
+          </a:ln>
+        </p:spPr>
+        <p:style>
+          <a:lnRef idx="2">
+            <a:schemeClr val="accent1">
+              <a:shade val="50000"/>
+            </a:schemeClr>
+          </a:lnRef>
+          <a:fillRef idx="1">
+            <a:schemeClr val="accent1"/>
+          </a:fillRef>
+          <a:effectRef idx="0">
+            <a:schemeClr val="accent1"/>
+          </a:effectRef>
+          <a:fontRef idx="minor">
+            <a:schemeClr val="lt1"/>
+          </a:fontRef>
+        </p:style>
+        <p:txBody>
+          <a:bodyPr rtlCol="0" anchor="ctr"/>
+          <a:lstStyle/>
+          <a:p>
+            <a:pPr algn="ctr"/>
+            <a:endParaRPr lang="en-US"/>
+          </a:p>
+        </p:txBody>
+      </p:sp>
+      <p:sp>
+        <p:nvSpPr>
+          <p:cNvPr id="47" name="TextBox 46">
+            <a:extLst>
+              <a:ext uri="{FF2B5EF4-FFF2-40B4-BE49-F238E27FC236}">
+                <a16:creationId xmlns:a16="http://schemas.microsoft.com/office/drawing/2014/main" id="{015ADE92-A41C-46EE-B137-83D4F045B8CA}"/>
+              </a:ext>
+            </a:extLst>
+          </p:cNvPr>
+          <p:cNvSpPr txBox="1"/>
+          <p:nvPr/>
+        </p:nvSpPr>
+        <p:spPr>
+          <a:xfrm>
+            <a:off x="2311395" y="2375039"/>
+            <a:ext cx="2292933" cy="605244"/>
+          </a:xfrm>
+          <a:prstGeom prst="rect">
+            <a:avLst/>
+          </a:prstGeom>
+          <a:noFill/>
+        </p:spPr>
+        <p:txBody>
+          <a:bodyPr wrap="square" rtlCol="0">
+            <a:spAutoFit/>
+          </a:bodyPr>
+          <a:lstStyle/>
+          <a:p>
+            <a:pPr algn="ctr"/>
+            <a:r>
+              <a:rPr lang="en-US" sz="1200" dirty="0"/>
+              <a:t>Irrigation demand calculated using f(</a:t>
+            </a:r>
+            <a:r>
+              <a:rPr lang="en-US" sz="1200" dirty="0" err="1"/>
+              <a:t>ET</a:t>
+            </a:r>
+            <a:r>
+              <a:rPr lang="en-US" sz="1200" baseline="-25000" dirty="0" err="1"/>
+              <a:t>d</a:t>
+            </a:r>
+            <a:r>
+              <a:rPr lang="en-US" sz="1200" dirty="0" err="1"/>
+              <a:t>-ET</a:t>
+            </a:r>
+            <a:r>
+              <a:rPr lang="en-US" sz="1200" baseline="-25000" dirty="0" err="1"/>
+              <a:t>a</a:t>
+            </a:r>
+            <a:r>
+              <a:rPr lang="en-US" sz="1200" dirty="0"/>
+              <a:t>)</a:t>
+            </a:r>
+            <a:endParaRPr lang="en-US" sz="1200" baseline="-25000" dirty="0"/>
+          </a:p>
+          <a:p>
+            <a:pPr algn="ctr"/>
+            <a:r>
+              <a:rPr lang="en-US" sz="1200" dirty="0"/>
+              <a:t>(ETDEMAND)</a:t>
+            </a:r>
+          </a:p>
+        </p:txBody>
+      </p:sp>
+      <p:sp>
+        <p:nvSpPr>
+          <p:cNvPr id="48" name="Rectangle 47">
+            <a:extLst>
+              <a:ext uri="{FF2B5EF4-FFF2-40B4-BE49-F238E27FC236}">
+                <a16:creationId xmlns:a16="http://schemas.microsoft.com/office/drawing/2014/main" id="{4AA5B190-770F-45A0-A102-DC08902A3FF9}"/>
+              </a:ext>
+            </a:extLst>
+          </p:cNvPr>
+          <p:cNvSpPr/>
+          <p:nvPr/>
+        </p:nvSpPr>
+        <p:spPr>
+          <a:xfrm>
+            <a:off x="2751020" y="1761129"/>
+            <a:ext cx="1332693" cy="419625"/>
+          </a:xfrm>
+          <a:prstGeom prst="rect">
+            <a:avLst/>
+          </a:prstGeom>
+          <a:noFill/>
+          <a:ln>
+            <a:solidFill>
+              <a:schemeClr val="tx1"/>
+            </a:solidFill>
+          </a:ln>
+        </p:spPr>
+        <p:style>
+          <a:lnRef idx="2">
+            <a:schemeClr val="accent1">
+              <a:shade val="50000"/>
+            </a:schemeClr>
+          </a:lnRef>
+          <a:fillRef idx="1">
+            <a:schemeClr val="accent1"/>
+          </a:fillRef>
+          <a:effectRef idx="0">
+            <a:schemeClr val="accent1"/>
+          </a:effectRef>
+          <a:fontRef idx="minor">
+            <a:schemeClr val="lt1"/>
+          </a:fontRef>
+        </p:style>
+        <p:txBody>
+          <a:bodyPr rtlCol="0" anchor="ctr"/>
+          <a:lstStyle/>
+          <a:p>
+            <a:pPr algn="ctr"/>
+            <a:endParaRPr lang="en-US"/>
+          </a:p>
+        </p:txBody>
+      </p:sp>
+      <p:sp>
+        <p:nvSpPr>
+          <p:cNvPr id="49" name="TextBox 48">
+            <a:extLst>
+              <a:ext uri="{FF2B5EF4-FFF2-40B4-BE49-F238E27FC236}">
+                <a16:creationId xmlns:a16="http://schemas.microsoft.com/office/drawing/2014/main" id="{9414A193-A0A5-4228-BEF9-6BFF4833D903}"/>
+              </a:ext>
+            </a:extLst>
+          </p:cNvPr>
+          <p:cNvSpPr txBox="1"/>
+          <p:nvPr/>
+        </p:nvSpPr>
+        <p:spPr>
+          <a:xfrm>
+            <a:off x="2594378" y="1746044"/>
+            <a:ext cx="1723696" cy="461665"/>
+          </a:xfrm>
+          <a:prstGeom prst="rect">
+            <a:avLst/>
+          </a:prstGeom>
+          <a:noFill/>
+        </p:spPr>
+        <p:txBody>
+          <a:bodyPr wrap="square" rtlCol="0">
+            <a:spAutoFit/>
+          </a:bodyPr>
+          <a:lstStyle/>
+          <a:p>
+            <a:pPr algn="ctr"/>
+            <a:r>
+              <a:rPr lang="en-US" sz="1200" dirty="0" err="1"/>
+              <a:t>ETa</a:t>
+            </a:r>
+            <a:r>
+              <a:rPr lang="en-US" sz="1200" dirty="0"/>
+              <a:t> is calculated by UZF/PRMS</a:t>
+            </a:r>
+          </a:p>
+        </p:txBody>
+      </p:sp>
+      <p:cxnSp>
+        <p:nvCxnSpPr>
+          <p:cNvPr id="50" name="Straight Arrow Connector 49">
+            <a:extLst>
+              <a:ext uri="{FF2B5EF4-FFF2-40B4-BE49-F238E27FC236}">
+                <a16:creationId xmlns:a16="http://schemas.microsoft.com/office/drawing/2014/main" id="{DC36B4FD-8F26-4B2E-BB36-85BC0ADFDE7B}"/>
+              </a:ext>
+            </a:extLst>
+          </p:cNvPr>
           <p:cNvCxnSpPr/>
           <p:nvPr/>
         </p:nvCxnSpPr>
         <p:spPr>
           <a:xfrm>
-            <a:off x="3441299" y="2632014"/>
+            <a:off x="3417366" y="2194294"/>
             <a:ext cx="0" cy="225385"/>
           </a:xfrm>
           <a:prstGeom prst="straightConnector1">
@@ -5674,14 +7113,22 @@
       </p:cxnSp>
       <p:cxnSp>
         <p:nvCxnSpPr>
-          <p:cNvPr id="48" name="Straight Arrow Connector 47"/>
-          <p:cNvCxnSpPr/>
+          <p:cNvPr id="51" name="Straight Arrow Connector 50">
+            <a:extLst>
+              <a:ext uri="{FF2B5EF4-FFF2-40B4-BE49-F238E27FC236}">
+                <a16:creationId xmlns:a16="http://schemas.microsoft.com/office/drawing/2014/main" id="{FF51AE92-DB56-421B-BE37-0276AD554201}"/>
+              </a:ext>
+            </a:extLst>
+          </p:cNvPr>
+          <p:cNvCxnSpPr>
+            <a:cxnSpLocks/>
+          </p:cNvCxnSpPr>
           <p:nvPr/>
         </p:nvCxnSpPr>
         <p:spPr>
           <a:xfrm>
-            <a:off x="3456226" y="3726051"/>
-            <a:ext cx="0" cy="225385"/>
+            <a:off x="3441297" y="3011361"/>
+            <a:ext cx="0" cy="453946"/>
           </a:xfrm>
           <a:prstGeom prst="straightConnector1">
             <a:avLst/>
@@ -5711,13 +7158,19 @@
       </p:cxnSp>
       <p:sp>
         <p:nvSpPr>
-          <p:cNvPr id="16" name="TextBox 15"/>
+          <p:cNvPr id="52" name="TextBox 51">
+            <a:extLst>
+              <a:ext uri="{FF2B5EF4-FFF2-40B4-BE49-F238E27FC236}">
+                <a16:creationId xmlns:a16="http://schemas.microsoft.com/office/drawing/2014/main" id="{3272C1E1-41C6-48B1-9F37-5812F3454183}"/>
+              </a:ext>
+            </a:extLst>
+          </p:cNvPr>
           <p:cNvSpPr txBox="1"/>
           <p:nvPr/>
         </p:nvSpPr>
         <p:spPr>
           <a:xfrm>
-            <a:off x="3490165" y="4805747"/>
+            <a:off x="3467297" y="4356541"/>
             <a:ext cx="3761094" cy="276999"/>
           </a:xfrm>
           <a:prstGeom prst="rect">
@@ -5740,14 +7193,23 @@
       </p:sp>
       <p:cxnSp>
         <p:nvCxnSpPr>
-          <p:cNvPr id="29" name="Straight Connector 28"/>
-          <p:cNvCxnSpPr/>
+          <p:cNvPr id="53" name="Straight Connector 52">
+            <a:extLst>
+              <a:ext uri="{FF2B5EF4-FFF2-40B4-BE49-F238E27FC236}">
+                <a16:creationId xmlns:a16="http://schemas.microsoft.com/office/drawing/2014/main" id="{D8B5C975-C527-4A2C-B322-2C4432A7A932}"/>
+              </a:ext>
+            </a:extLst>
+          </p:cNvPr>
+          <p:cNvCxnSpPr>
+            <a:cxnSpLocks/>
+            <a:endCxn id="57" idx="3"/>
+          </p:cNvCxnSpPr>
           <p:nvPr/>
         </p:nvCxnSpPr>
         <p:spPr>
-          <a:xfrm flipH="1">
-            <a:off x="1941388" y="6383792"/>
-            <a:ext cx="365760" cy="0"/>
+          <a:xfrm flipH="1" flipV="1">
+            <a:off x="1766654" y="5616793"/>
+            <a:ext cx="533210" cy="0"/>
           </a:xfrm>
           <a:prstGeom prst="line">
             <a:avLst/>
@@ -5775,14 +7237,20 @@
       </p:cxnSp>
       <p:cxnSp>
         <p:nvCxnSpPr>
-          <p:cNvPr id="32" name="Straight Connector 31"/>
+          <p:cNvPr id="54" name="Straight Connector 53">
+            <a:extLst>
+              <a:ext uri="{FF2B5EF4-FFF2-40B4-BE49-F238E27FC236}">
+                <a16:creationId xmlns:a16="http://schemas.microsoft.com/office/drawing/2014/main" id="{1B39BF77-DC62-49EA-8999-506EA02221A2}"/>
+              </a:ext>
+            </a:extLst>
+          </p:cNvPr>
           <p:cNvCxnSpPr/>
           <p:nvPr/>
         </p:nvCxnSpPr>
         <p:spPr>
           <a:xfrm flipH="1" flipV="1">
-            <a:off x="1933644" y="3465307"/>
-            <a:ext cx="0" cy="2926080"/>
+            <a:off x="1772816" y="3198350"/>
+            <a:ext cx="0" cy="2423160"/>
           </a:xfrm>
           <a:prstGeom prst="line">
             <a:avLst/>
@@ -5810,16 +7278,474 @@
       </p:cxnSp>
       <p:cxnSp>
         <p:nvCxnSpPr>
-          <p:cNvPr id="50" name="Straight Arrow Connector 49"/>
+          <p:cNvPr id="55" name="Straight Connector 54">
+            <a:extLst>
+              <a:ext uri="{FF2B5EF4-FFF2-40B4-BE49-F238E27FC236}">
+                <a16:creationId xmlns:a16="http://schemas.microsoft.com/office/drawing/2014/main" id="{73822334-9969-4462-8B1F-5823D38F772A}"/>
+              </a:ext>
+            </a:extLst>
+          </p:cNvPr>
           <p:cNvCxnSpPr>
-            <a:endCxn id="37" idx="1"/>
+            <a:cxnSpLocks/>
+            <a:endCxn id="61" idx="3"/>
           </p:cNvCxnSpPr>
           <p:nvPr/>
         </p:nvCxnSpPr>
         <p:spPr>
-          <a:xfrm>
-            <a:off x="1915510" y="2239040"/>
-            <a:ext cx="668499" cy="126"/>
+          <a:xfrm flipH="1">
+            <a:off x="1759249" y="3897619"/>
+            <a:ext cx="450490" cy="0"/>
+          </a:xfrm>
+          <a:prstGeom prst="line">
+            <a:avLst/>
+          </a:prstGeom>
+          <a:ln w="19050">
+            <a:solidFill>
+              <a:schemeClr val="tx1"/>
+            </a:solidFill>
+          </a:ln>
+        </p:spPr>
+        <p:style>
+          <a:lnRef idx="1">
+            <a:schemeClr val="accent1"/>
+          </a:lnRef>
+          <a:fillRef idx="0">
+            <a:schemeClr val="accent1"/>
+          </a:fillRef>
+          <a:effectRef idx="0">
+            <a:schemeClr val="accent1"/>
+          </a:effectRef>
+          <a:fontRef idx="minor">
+            <a:schemeClr val="tx1"/>
+          </a:fontRef>
+        </p:style>
+      </p:cxnSp>
+      <p:sp>
+        <p:nvSpPr>
+          <p:cNvPr id="56" name="TextBox 55">
+            <a:extLst>
+              <a:ext uri="{FF2B5EF4-FFF2-40B4-BE49-F238E27FC236}">
+                <a16:creationId xmlns:a16="http://schemas.microsoft.com/office/drawing/2014/main" id="{A590F2EB-75C1-4D54-9532-CB378105419A}"/>
+              </a:ext>
+            </a:extLst>
+          </p:cNvPr>
+          <p:cNvSpPr txBox="1"/>
+          <p:nvPr/>
+        </p:nvSpPr>
+        <p:spPr>
+          <a:xfrm>
+            <a:off x="322858" y="1657670"/>
+            <a:ext cx="1919372" cy="276999"/>
+          </a:xfrm>
+          <a:prstGeom prst="rect">
+            <a:avLst/>
+          </a:prstGeom>
+          <a:noFill/>
+        </p:spPr>
+        <p:txBody>
+          <a:bodyPr wrap="none" rtlCol="0">
+            <a:spAutoFit/>
+          </a:bodyPr>
+          <a:lstStyle/>
+          <a:p>
+            <a:r>
+              <a:rPr lang="en-US" sz="1200" dirty="0"/>
+              <a:t>Apply SW and GW irrigation</a:t>
+            </a:r>
+          </a:p>
+        </p:txBody>
+      </p:sp>
+      <p:sp>
+        <p:nvSpPr>
+          <p:cNvPr id="57" name="TextBox 56">
+            <a:extLst>
+              <a:ext uri="{FF2B5EF4-FFF2-40B4-BE49-F238E27FC236}">
+                <a16:creationId xmlns:a16="http://schemas.microsoft.com/office/drawing/2014/main" id="{4FB5BC83-52F6-48C0-8740-989145CC39C3}"/>
+              </a:ext>
+            </a:extLst>
+          </p:cNvPr>
+          <p:cNvSpPr txBox="1"/>
+          <p:nvPr/>
+        </p:nvSpPr>
+        <p:spPr>
+          <a:xfrm>
+            <a:off x="792413" y="5478293"/>
+            <a:ext cx="974241" cy="276999"/>
+          </a:xfrm>
+          <a:prstGeom prst="rect">
+            <a:avLst/>
+          </a:prstGeom>
+          <a:noFill/>
+        </p:spPr>
+        <p:txBody>
+          <a:bodyPr wrap="none" rtlCol="0">
+            <a:spAutoFit/>
+          </a:bodyPr>
+          <a:lstStyle/>
+          <a:p>
+            <a:r>
+              <a:rPr lang="en-US" sz="1200" dirty="0"/>
+              <a:t>Pumped GW</a:t>
+            </a:r>
+          </a:p>
+        </p:txBody>
+      </p:sp>
+      <p:cxnSp>
+        <p:nvCxnSpPr>
+          <p:cNvPr id="58" name="Straight Arrow Connector 57">
+            <a:extLst>
+              <a:ext uri="{FF2B5EF4-FFF2-40B4-BE49-F238E27FC236}">
+                <a16:creationId xmlns:a16="http://schemas.microsoft.com/office/drawing/2014/main" id="{759AAF65-8F25-4B46-B2F5-9AD101B5473D}"/>
+              </a:ext>
+            </a:extLst>
+          </p:cNvPr>
+          <p:cNvCxnSpPr/>
+          <p:nvPr/>
+        </p:nvCxnSpPr>
+        <p:spPr>
+          <a:xfrm>
+            <a:off x="3417668" y="1478574"/>
+            <a:ext cx="0" cy="304371"/>
+          </a:xfrm>
+          <a:prstGeom prst="straightConnector1">
+            <a:avLst/>
+          </a:prstGeom>
+          <a:ln w="19050">
+            <a:solidFill>
+              <a:schemeClr val="tx1"/>
+            </a:solidFill>
+            <a:headEnd type="none" w="med" len="med"/>
+            <a:tailEnd type="triangle" w="med" len="med"/>
+          </a:ln>
+        </p:spPr>
+        <p:style>
+          <a:lnRef idx="1">
+            <a:schemeClr val="accent1"/>
+          </a:lnRef>
+          <a:fillRef idx="0">
+            <a:schemeClr val="accent1"/>
+          </a:fillRef>
+          <a:effectRef idx="0">
+            <a:schemeClr val="accent1"/>
+          </a:effectRef>
+          <a:fontRef idx="minor">
+            <a:schemeClr val="tx1"/>
+          </a:fontRef>
+        </p:style>
+      </p:cxnSp>
+      <p:sp>
+        <p:nvSpPr>
+          <p:cNvPr id="59" name="Rectangle 58">
+            <a:extLst>
+              <a:ext uri="{FF2B5EF4-FFF2-40B4-BE49-F238E27FC236}">
+                <a16:creationId xmlns:a16="http://schemas.microsoft.com/office/drawing/2014/main" id="{2B945BB3-6CF2-4907-BE41-11B16B1D292D}"/>
+              </a:ext>
+            </a:extLst>
+          </p:cNvPr>
+          <p:cNvSpPr/>
+          <p:nvPr/>
+        </p:nvSpPr>
+        <p:spPr>
+          <a:xfrm>
+            <a:off x="2165414" y="1009750"/>
+            <a:ext cx="2551767" cy="461665"/>
+          </a:xfrm>
+          <a:prstGeom prst="rect">
+            <a:avLst/>
+          </a:prstGeom>
+        </p:spPr>
+        <p:txBody>
+          <a:bodyPr wrap="square">
+            <a:spAutoFit/>
+          </a:bodyPr>
+          <a:lstStyle/>
+          <a:p>
+            <a:pPr algn="ctr"/>
+            <a:r>
+              <a:rPr lang="en-US" sz="1200" dirty="0"/>
+              <a:t>Externally (UZF) or internally (PRMS) calculated </a:t>
+            </a:r>
+            <a:r>
+              <a:rPr lang="en-US" sz="1200" dirty="0" err="1"/>
+              <a:t>ET</a:t>
+            </a:r>
+            <a:r>
+              <a:rPr lang="en-US" sz="1200" baseline="-25000" dirty="0" err="1"/>
+              <a:t>d</a:t>
+            </a:r>
+            <a:endParaRPr lang="en-US" sz="1200" baseline="-25000" dirty="0"/>
+          </a:p>
+        </p:txBody>
+      </p:sp>
+      <p:sp>
+        <p:nvSpPr>
+          <p:cNvPr id="60" name="Rectangle 59">
+            <a:extLst>
+              <a:ext uri="{FF2B5EF4-FFF2-40B4-BE49-F238E27FC236}">
+                <a16:creationId xmlns:a16="http://schemas.microsoft.com/office/drawing/2014/main" id="{06238FE9-A73C-4F0F-8F63-16B711744247}"/>
+              </a:ext>
+            </a:extLst>
+          </p:cNvPr>
+          <p:cNvSpPr/>
+          <p:nvPr/>
+        </p:nvSpPr>
+        <p:spPr>
+          <a:xfrm>
+            <a:off x="2249760" y="992347"/>
+            <a:ext cx="2354568" cy="479068"/>
+          </a:xfrm>
+          <a:prstGeom prst="rect">
+            <a:avLst/>
+          </a:prstGeom>
+          <a:noFill/>
+          <a:ln>
+            <a:solidFill>
+              <a:schemeClr val="tx1"/>
+            </a:solidFill>
+          </a:ln>
+        </p:spPr>
+        <p:style>
+          <a:lnRef idx="2">
+            <a:schemeClr val="accent1">
+              <a:shade val="50000"/>
+            </a:schemeClr>
+          </a:lnRef>
+          <a:fillRef idx="1">
+            <a:schemeClr val="accent1"/>
+          </a:fillRef>
+          <a:effectRef idx="0">
+            <a:schemeClr val="accent1"/>
+          </a:effectRef>
+          <a:fontRef idx="minor">
+            <a:schemeClr val="lt1"/>
+          </a:fontRef>
+        </p:style>
+        <p:txBody>
+          <a:bodyPr rtlCol="0" anchor="ctr"/>
+          <a:lstStyle/>
+          <a:p>
+            <a:pPr algn="ctr"/>
+            <a:endParaRPr lang="en-US"/>
+          </a:p>
+        </p:txBody>
+      </p:sp>
+      <p:sp>
+        <p:nvSpPr>
+          <p:cNvPr id="61" name="TextBox 60">
+            <a:extLst>
+              <a:ext uri="{FF2B5EF4-FFF2-40B4-BE49-F238E27FC236}">
+                <a16:creationId xmlns:a16="http://schemas.microsoft.com/office/drawing/2014/main" id="{7510EA7B-837C-4929-95C9-90F859B1ABD5}"/>
+              </a:ext>
+            </a:extLst>
+          </p:cNvPr>
+          <p:cNvSpPr txBox="1"/>
+          <p:nvPr/>
+        </p:nvSpPr>
+        <p:spPr>
+          <a:xfrm>
+            <a:off x="799819" y="3768699"/>
+            <a:ext cx="959430" cy="276999"/>
+          </a:xfrm>
+          <a:prstGeom prst="rect">
+            <a:avLst/>
+          </a:prstGeom>
+          <a:noFill/>
+        </p:spPr>
+        <p:txBody>
+          <a:bodyPr wrap="none" rtlCol="0">
+            <a:spAutoFit/>
+          </a:bodyPr>
+          <a:lstStyle/>
+          <a:p>
+            <a:r>
+              <a:rPr lang="en-US" sz="1200" dirty="0"/>
+              <a:t>Diverted SW</a:t>
+            </a:r>
+          </a:p>
+        </p:txBody>
+      </p:sp>
+      <p:sp>
+        <p:nvSpPr>
+          <p:cNvPr id="62" name="TextBox 61">
+            <a:extLst>
+              <a:ext uri="{FF2B5EF4-FFF2-40B4-BE49-F238E27FC236}">
+                <a16:creationId xmlns:a16="http://schemas.microsoft.com/office/drawing/2014/main" id="{179B3E0A-6F29-49D0-A05F-4BD94C925CC6}"/>
+              </a:ext>
+            </a:extLst>
+          </p:cNvPr>
+          <p:cNvSpPr txBox="1"/>
+          <p:nvPr/>
+        </p:nvSpPr>
+        <p:spPr>
+          <a:xfrm>
+            <a:off x="1402044" y="2712376"/>
+            <a:ext cx="940725" cy="461665"/>
+          </a:xfrm>
+          <a:prstGeom prst="rect">
+            <a:avLst/>
+          </a:prstGeom>
+          <a:noFill/>
+        </p:spPr>
+        <p:txBody>
+          <a:bodyPr wrap="square" rtlCol="0">
+            <a:spAutoFit/>
+          </a:bodyPr>
+          <a:lstStyle/>
+          <a:p>
+            <a:r>
+              <a:rPr lang="en-US" sz="1200" dirty="0"/>
+              <a:t>Nonlinear iterations</a:t>
+            </a:r>
+          </a:p>
+        </p:txBody>
+      </p:sp>
+      <p:cxnSp>
+        <p:nvCxnSpPr>
+          <p:cNvPr id="63" name="Straight Connector 62">
+            <a:extLst>
+              <a:ext uri="{FF2B5EF4-FFF2-40B4-BE49-F238E27FC236}">
+                <a16:creationId xmlns:a16="http://schemas.microsoft.com/office/drawing/2014/main" id="{6C28EE28-15DC-4E87-A8A3-86FC9CA76EBA}"/>
+              </a:ext>
+            </a:extLst>
+          </p:cNvPr>
+          <p:cNvCxnSpPr>
+            <a:cxnSpLocks/>
+          </p:cNvCxnSpPr>
+          <p:nvPr/>
+        </p:nvCxnSpPr>
+        <p:spPr>
+          <a:xfrm flipH="1" flipV="1">
+            <a:off x="1782147" y="1966846"/>
+            <a:ext cx="0" cy="772320"/>
+          </a:xfrm>
+          <a:prstGeom prst="line">
+            <a:avLst/>
+          </a:prstGeom>
+          <a:ln w="19050">
+            <a:solidFill>
+              <a:schemeClr val="tx1"/>
+            </a:solidFill>
+          </a:ln>
+        </p:spPr>
+        <p:style>
+          <a:lnRef idx="1">
+            <a:schemeClr val="accent1"/>
+          </a:lnRef>
+          <a:fillRef idx="0">
+            <a:schemeClr val="accent1"/>
+          </a:fillRef>
+          <a:effectRef idx="0">
+            <a:schemeClr val="accent1"/>
+          </a:effectRef>
+          <a:fontRef idx="minor">
+            <a:schemeClr val="tx1"/>
+          </a:fontRef>
+        </p:style>
+      </p:cxnSp>
+      <p:sp>
+        <p:nvSpPr>
+          <p:cNvPr id="64" name="TextBox 63">
+            <a:extLst>
+              <a:ext uri="{FF2B5EF4-FFF2-40B4-BE49-F238E27FC236}">
+                <a16:creationId xmlns:a16="http://schemas.microsoft.com/office/drawing/2014/main" id="{3B524C7A-4202-40B2-B210-AF7259741220}"/>
+              </a:ext>
+            </a:extLst>
+          </p:cNvPr>
+          <p:cNvSpPr txBox="1"/>
+          <p:nvPr/>
+        </p:nvSpPr>
+        <p:spPr>
+          <a:xfrm>
+            <a:off x="4294522" y="1752258"/>
+            <a:ext cx="2397980" cy="461665"/>
+          </a:xfrm>
+          <a:prstGeom prst="rect">
+            <a:avLst/>
+          </a:prstGeom>
+          <a:noFill/>
+        </p:spPr>
+        <p:txBody>
+          <a:bodyPr wrap="square" rtlCol="0">
+            <a:spAutoFit/>
+          </a:bodyPr>
+          <a:lstStyle/>
+          <a:p>
+            <a:pPr algn="ctr"/>
+            <a:r>
+              <a:rPr lang="en-US" sz="1200" dirty="0"/>
+              <a:t>Return flows (SW+GW) calculated by UZF/PRMS</a:t>
+            </a:r>
+          </a:p>
+        </p:txBody>
+      </p:sp>
+      <p:sp>
+        <p:nvSpPr>
+          <p:cNvPr id="65" name="Rectangle 64">
+            <a:extLst>
+              <a:ext uri="{FF2B5EF4-FFF2-40B4-BE49-F238E27FC236}">
+                <a16:creationId xmlns:a16="http://schemas.microsoft.com/office/drawing/2014/main" id="{D3F91603-BA55-4D57-A43B-A6CC234583BB}"/>
+              </a:ext>
+            </a:extLst>
+          </p:cNvPr>
+          <p:cNvSpPr/>
+          <p:nvPr/>
+        </p:nvSpPr>
+        <p:spPr>
+          <a:xfrm>
+            <a:off x="4373934" y="1755206"/>
+            <a:ext cx="2217264" cy="423281"/>
+          </a:xfrm>
+          <a:prstGeom prst="rect">
+            <a:avLst/>
+          </a:prstGeom>
+          <a:noFill/>
+          <a:ln>
+            <a:solidFill>
+              <a:schemeClr val="tx1"/>
+            </a:solidFill>
+          </a:ln>
+        </p:spPr>
+        <p:style>
+          <a:lnRef idx="2">
+            <a:schemeClr val="accent1">
+              <a:shade val="50000"/>
+            </a:schemeClr>
+          </a:lnRef>
+          <a:fillRef idx="1">
+            <a:schemeClr val="accent1"/>
+          </a:fillRef>
+          <a:effectRef idx="0">
+            <a:schemeClr val="accent1"/>
+          </a:effectRef>
+          <a:fontRef idx="minor">
+            <a:schemeClr val="lt1"/>
+          </a:fontRef>
+        </p:style>
+        <p:txBody>
+          <a:bodyPr rtlCol="0" anchor="ctr"/>
+          <a:lstStyle/>
+          <a:p>
+            <a:pPr algn="ctr"/>
+            <a:endParaRPr lang="en-US"/>
+          </a:p>
+        </p:txBody>
+      </p:sp>
+      <p:cxnSp>
+        <p:nvCxnSpPr>
+          <p:cNvPr id="66" name="Straight Arrow Connector 65">
+            <a:extLst>
+              <a:ext uri="{FF2B5EF4-FFF2-40B4-BE49-F238E27FC236}">
+                <a16:creationId xmlns:a16="http://schemas.microsoft.com/office/drawing/2014/main" id="{C47AE83E-1C85-451B-8585-3C97478C6916}"/>
+              </a:ext>
+            </a:extLst>
+          </p:cNvPr>
+          <p:cNvCxnSpPr/>
+          <p:nvPr/>
+        </p:nvCxnSpPr>
+        <p:spPr>
+          <a:xfrm>
+            <a:off x="4083713" y="1970941"/>
+            <a:ext cx="296623" cy="0"/>
           </a:xfrm>
           <a:prstGeom prst="straightConnector1">
             <a:avLst/>
@@ -5829,6 +7755,335 @@
               <a:schemeClr val="tx1"/>
             </a:solidFill>
             <a:tailEnd type="triangle"/>
+          </a:ln>
+        </p:spPr>
+        <p:style>
+          <a:lnRef idx="1">
+            <a:schemeClr val="accent1"/>
+          </a:lnRef>
+          <a:fillRef idx="0">
+            <a:schemeClr val="accent1"/>
+          </a:fillRef>
+          <a:effectRef idx="0">
+            <a:schemeClr val="accent1"/>
+          </a:effectRef>
+          <a:fontRef idx="minor">
+            <a:schemeClr val="tx1"/>
+          </a:fontRef>
+        </p:style>
+      </p:cxnSp>
+      <p:sp>
+        <p:nvSpPr>
+          <p:cNvPr id="67" name="Rectangle 66">
+            <a:extLst>
+              <a:ext uri="{FF2B5EF4-FFF2-40B4-BE49-F238E27FC236}">
+                <a16:creationId xmlns:a16="http://schemas.microsoft.com/office/drawing/2014/main" id="{4ABF2492-D3CF-4BE4-8018-91F1FEF5FA87}"/>
+              </a:ext>
+            </a:extLst>
+          </p:cNvPr>
+          <p:cNvSpPr/>
+          <p:nvPr/>
+        </p:nvSpPr>
+        <p:spPr>
+          <a:xfrm>
+            <a:off x="4083713" y="3069759"/>
+            <a:ext cx="2180502" cy="276999"/>
+          </a:xfrm>
+          <a:prstGeom prst="rect">
+            <a:avLst/>
+          </a:prstGeom>
+          <a:noFill/>
+          <a:ln>
+            <a:solidFill>
+              <a:schemeClr val="tx1"/>
+            </a:solidFill>
+          </a:ln>
+        </p:spPr>
+        <p:style>
+          <a:lnRef idx="2">
+            <a:schemeClr val="accent1">
+              <a:shade val="50000"/>
+            </a:schemeClr>
+          </a:lnRef>
+          <a:fillRef idx="1">
+            <a:schemeClr val="accent1"/>
+          </a:fillRef>
+          <a:effectRef idx="0">
+            <a:schemeClr val="accent1"/>
+          </a:effectRef>
+          <a:fontRef idx="minor">
+            <a:schemeClr val="lt1"/>
+          </a:fontRef>
+        </p:style>
+        <p:txBody>
+          <a:bodyPr rtlCol="0" anchor="ctr"/>
+          <a:lstStyle/>
+          <a:p>
+            <a:pPr algn="ctr"/>
+            <a:endParaRPr lang="en-US"/>
+          </a:p>
+        </p:txBody>
+      </p:sp>
+      <p:sp>
+        <p:nvSpPr>
+          <p:cNvPr id="68" name="TextBox 67">
+            <a:extLst>
+              <a:ext uri="{FF2B5EF4-FFF2-40B4-BE49-F238E27FC236}">
+                <a16:creationId xmlns:a16="http://schemas.microsoft.com/office/drawing/2014/main" id="{E9A0BDE9-0BB9-41F0-B64E-5263BA0D4BAD}"/>
+              </a:ext>
+            </a:extLst>
+          </p:cNvPr>
+          <p:cNvSpPr txBox="1"/>
+          <p:nvPr/>
+        </p:nvSpPr>
+        <p:spPr>
+          <a:xfrm>
+            <a:off x="3840436" y="3085776"/>
+            <a:ext cx="2663007" cy="276999"/>
+          </a:xfrm>
+          <a:prstGeom prst="rect">
+            <a:avLst/>
+          </a:prstGeom>
+          <a:noFill/>
+        </p:spPr>
+        <p:txBody>
+          <a:bodyPr wrap="square" rtlCol="0">
+            <a:spAutoFit/>
+          </a:bodyPr>
+          <a:lstStyle/>
+          <a:p>
+            <a:pPr algn="ctr"/>
+            <a:r>
+              <a:rPr lang="en-US" sz="1200" dirty="0"/>
+              <a:t>GW pumping rate set in AG input</a:t>
+            </a:r>
+          </a:p>
+        </p:txBody>
+      </p:sp>
+      <p:sp>
+        <p:nvSpPr>
+          <p:cNvPr id="69" name="Rectangle 68">
+            <a:extLst>
+              <a:ext uri="{FF2B5EF4-FFF2-40B4-BE49-F238E27FC236}">
+                <a16:creationId xmlns:a16="http://schemas.microsoft.com/office/drawing/2014/main" id="{8C7F452A-AF5E-4511-8892-5AB32EEA7924}"/>
+              </a:ext>
+            </a:extLst>
+          </p:cNvPr>
+          <p:cNvSpPr/>
+          <p:nvPr/>
+        </p:nvSpPr>
+        <p:spPr>
+          <a:xfrm>
+            <a:off x="2292931" y="5361300"/>
+            <a:ext cx="2286000" cy="393992"/>
+          </a:xfrm>
+          <a:prstGeom prst="rect">
+            <a:avLst/>
+          </a:prstGeom>
+          <a:noFill/>
+          <a:ln>
+            <a:solidFill>
+              <a:schemeClr val="tx1"/>
+            </a:solidFill>
+          </a:ln>
+        </p:spPr>
+        <p:style>
+          <a:lnRef idx="2">
+            <a:schemeClr val="accent1">
+              <a:shade val="50000"/>
+            </a:schemeClr>
+          </a:lnRef>
+          <a:fillRef idx="1">
+            <a:schemeClr val="accent1"/>
+          </a:fillRef>
+          <a:effectRef idx="0">
+            <a:schemeClr val="accent1"/>
+          </a:effectRef>
+          <a:fontRef idx="minor">
+            <a:schemeClr val="lt1"/>
+          </a:fontRef>
+        </p:style>
+        <p:txBody>
+          <a:bodyPr rtlCol="0" anchor="ctr"/>
+          <a:lstStyle/>
+          <a:p>
+            <a:pPr algn="ctr"/>
+            <a:endParaRPr lang="en-US"/>
+          </a:p>
+        </p:txBody>
+      </p:sp>
+      <p:sp>
+        <p:nvSpPr>
+          <p:cNvPr id="70" name="TextBox 69">
+            <a:extLst>
+              <a:ext uri="{FF2B5EF4-FFF2-40B4-BE49-F238E27FC236}">
+                <a16:creationId xmlns:a16="http://schemas.microsoft.com/office/drawing/2014/main" id="{F1471588-69B3-48B0-BA9F-1D6878D82D7B}"/>
+              </a:ext>
+            </a:extLst>
+          </p:cNvPr>
+          <p:cNvSpPr txBox="1"/>
+          <p:nvPr/>
+        </p:nvSpPr>
+        <p:spPr>
+          <a:xfrm>
+            <a:off x="2136471" y="5342634"/>
+            <a:ext cx="2661651" cy="677108"/>
+          </a:xfrm>
+          <a:prstGeom prst="rect">
+            <a:avLst/>
+          </a:prstGeom>
+          <a:noFill/>
+        </p:spPr>
+        <p:txBody>
+          <a:bodyPr wrap="square" rtlCol="0">
+            <a:spAutoFit/>
+          </a:bodyPr>
+          <a:lstStyle/>
+          <a:p>
+            <a:pPr algn="ctr"/>
+            <a:r>
+              <a:rPr lang="en-US" sz="1200" dirty="0"/>
+              <a:t>GW irrigation</a:t>
+            </a:r>
+          </a:p>
+          <a:p>
+            <a:pPr algn="ctr"/>
+            <a:r>
+              <a:rPr lang="en-US" sz="1200" dirty="0"/>
+              <a:t>(IRRIGATIONWELL</a:t>
+            </a:r>
+            <a:r>
+              <a:rPr lang="en-US" sz="1000" dirty="0"/>
+              <a:t>)</a:t>
+            </a:r>
+          </a:p>
+          <a:p>
+            <a:pPr algn="ctr"/>
+            <a:endParaRPr lang="en-US" sz="1400" dirty="0"/>
+          </a:p>
+        </p:txBody>
+      </p:sp>
+      <p:sp>
+        <p:nvSpPr>
+          <p:cNvPr id="71" name="Rectangle 70">
+            <a:extLst>
+              <a:ext uri="{FF2B5EF4-FFF2-40B4-BE49-F238E27FC236}">
+                <a16:creationId xmlns:a16="http://schemas.microsoft.com/office/drawing/2014/main" id="{54FA20A0-C317-4676-843A-C24E971E68A1}"/>
+              </a:ext>
+            </a:extLst>
+          </p:cNvPr>
+          <p:cNvSpPr/>
+          <p:nvPr/>
+        </p:nvSpPr>
+        <p:spPr>
+          <a:xfrm>
+            <a:off x="2283600" y="4654877"/>
+            <a:ext cx="2286000" cy="432514"/>
+          </a:xfrm>
+          <a:prstGeom prst="rect">
+            <a:avLst/>
+          </a:prstGeom>
+          <a:noFill/>
+          <a:ln>
+            <a:solidFill>
+              <a:schemeClr val="tx1"/>
+            </a:solidFill>
+          </a:ln>
+        </p:spPr>
+        <p:style>
+          <a:lnRef idx="2">
+            <a:schemeClr val="accent1">
+              <a:shade val="50000"/>
+            </a:schemeClr>
+          </a:lnRef>
+          <a:fillRef idx="1">
+            <a:schemeClr val="accent1"/>
+          </a:fillRef>
+          <a:effectRef idx="0">
+            <a:schemeClr val="accent1"/>
+          </a:effectRef>
+          <a:fontRef idx="minor">
+            <a:schemeClr val="lt1"/>
+          </a:fontRef>
+        </p:style>
+        <p:txBody>
+          <a:bodyPr rtlCol="0" anchor="ctr"/>
+          <a:lstStyle/>
+          <a:p>
+            <a:pPr algn="ctr"/>
+            <a:endParaRPr lang="en-US"/>
+          </a:p>
+        </p:txBody>
+      </p:sp>
+      <p:sp>
+        <p:nvSpPr>
+          <p:cNvPr id="72" name="TextBox 71">
+            <a:extLst>
+              <a:ext uri="{FF2B5EF4-FFF2-40B4-BE49-F238E27FC236}">
+                <a16:creationId xmlns:a16="http://schemas.microsoft.com/office/drawing/2014/main" id="{BF939890-9C7F-4E1F-9C7A-41998E8AB7B9}"/>
+              </a:ext>
+            </a:extLst>
+          </p:cNvPr>
+          <p:cNvSpPr txBox="1"/>
+          <p:nvPr/>
+        </p:nvSpPr>
+        <p:spPr>
+          <a:xfrm>
+            <a:off x="2299863" y="4664092"/>
+            <a:ext cx="2300558" cy="461665"/>
+          </a:xfrm>
+          <a:prstGeom prst="rect">
+            <a:avLst/>
+          </a:prstGeom>
+          <a:noFill/>
+        </p:spPr>
+        <p:txBody>
+          <a:bodyPr wrap="square" rtlCol="0">
+            <a:spAutoFit/>
+          </a:bodyPr>
+          <a:lstStyle/>
+          <a:p>
+            <a:pPr algn="ctr"/>
+            <a:r>
+              <a:rPr lang="en-US" sz="1200" dirty="0"/>
+              <a:t>GW Demand set as SW shortfall</a:t>
+            </a:r>
+          </a:p>
+          <a:p>
+            <a:pPr algn="ctr"/>
+            <a:r>
+              <a:rPr lang="en-US" sz="1200" dirty="0"/>
+              <a:t>(SUPPLEMENTALWELL)</a:t>
+            </a:r>
+          </a:p>
+        </p:txBody>
+      </p:sp>
+      <p:cxnSp>
+        <p:nvCxnSpPr>
+          <p:cNvPr id="73" name="Straight Arrow Connector 72">
+            <a:extLst>
+              <a:ext uri="{FF2B5EF4-FFF2-40B4-BE49-F238E27FC236}">
+                <a16:creationId xmlns:a16="http://schemas.microsoft.com/office/drawing/2014/main" id="{F454031C-36BC-4F24-857E-B2A0A53D38DF}"/>
+              </a:ext>
+            </a:extLst>
+          </p:cNvPr>
+          <p:cNvCxnSpPr/>
+          <p:nvPr/>
+        </p:nvCxnSpPr>
+        <p:spPr>
+          <a:xfrm>
+            <a:off x="3441639" y="5087391"/>
+            <a:ext cx="0" cy="304371"/>
+          </a:xfrm>
+          <a:prstGeom prst="straightConnector1">
+            <a:avLst/>
+          </a:prstGeom>
+          <a:ln w="19050">
+            <a:solidFill>
+              <a:schemeClr val="tx1"/>
+            </a:solidFill>
+            <a:headEnd type="none" w="med" len="med"/>
+            <a:tailEnd type="triangle" w="med" len="med"/>
           </a:ln>
         </p:spPr>
         <p:style>
@@ -5848,22 +8103,32 @@
       </p:cxnSp>
       <p:cxnSp>
         <p:nvCxnSpPr>
-          <p:cNvPr id="54" name="Straight Connector 53"/>
-          <p:cNvCxnSpPr/>
+          <p:cNvPr id="74" name="Straight Arrow Connector 73">
+            <a:extLst>
+              <a:ext uri="{FF2B5EF4-FFF2-40B4-BE49-F238E27FC236}">
+                <a16:creationId xmlns:a16="http://schemas.microsoft.com/office/drawing/2014/main" id="{62B6AF2F-C4E4-4645-9628-17EAE7B7AF6B}"/>
+              </a:ext>
+            </a:extLst>
+          </p:cNvPr>
+          <p:cNvCxnSpPr>
+            <a:cxnSpLocks/>
+            <a:endCxn id="67" idx="1"/>
+          </p:cNvCxnSpPr>
           <p:nvPr/>
         </p:nvCxnSpPr>
         <p:spPr>
-          <a:xfrm flipH="1">
-            <a:off x="1933738" y="4382335"/>
-            <a:ext cx="316021" cy="0"/>
-          </a:xfrm>
-          <a:prstGeom prst="line">
+          <a:xfrm flipV="1">
+            <a:off x="3441297" y="3208259"/>
+            <a:ext cx="642416" cy="2912"/>
+          </a:xfrm>
+          <a:prstGeom prst="straightConnector1">
             <a:avLst/>
           </a:prstGeom>
           <a:ln w="19050">
             <a:solidFill>
               <a:schemeClr val="tx1"/>
             </a:solidFill>
+            <a:tailEnd type="triangle"/>
           </a:ln>
         </p:spPr>
         <p:style>
@@ -5883,14 +8148,20 @@
       </p:cxnSp>
       <p:sp>
         <p:nvSpPr>
-          <p:cNvPr id="55" name="TextBox 54"/>
+          <p:cNvPr id="75" name="TextBox 74">
+            <a:extLst>
+              <a:ext uri="{FF2B5EF4-FFF2-40B4-BE49-F238E27FC236}">
+                <a16:creationId xmlns:a16="http://schemas.microsoft.com/office/drawing/2014/main" id="{40860A6D-C5D1-4450-8C31-C0736BFD9934}"/>
+              </a:ext>
+            </a:extLst>
+          </p:cNvPr>
           <p:cNvSpPr txBox="1"/>
           <p:nvPr/>
         </p:nvSpPr>
         <p:spPr>
           <a:xfrm>
-            <a:off x="712507" y="1972532"/>
-            <a:ext cx="1919372" cy="276999"/>
+            <a:off x="3441297" y="2958604"/>
+            <a:ext cx="1098721" cy="276999"/>
           </a:xfrm>
           <a:prstGeom prst="rect">
             <a:avLst/>
@@ -5898,28 +8169,34 @@
           <a:noFill/>
         </p:spPr>
         <p:txBody>
-          <a:bodyPr wrap="none" rtlCol="0">
+          <a:bodyPr wrap="square" rtlCol="0">
             <a:spAutoFit/>
           </a:bodyPr>
           <a:lstStyle/>
           <a:p>
             <a:r>
               <a:rPr lang="en-US" sz="1200" dirty="0"/>
-              <a:t>Apply SW and GW irrigation</a:t>
-            </a:r>
-          </a:p>
-        </p:txBody>
-      </p:sp>
-      <p:sp>
-        <p:nvSpPr>
-          <p:cNvPr id="49" name="TextBox 48"/>
+              <a:t>No SW</a:t>
+            </a:r>
+          </a:p>
+        </p:txBody>
+      </p:sp>
+      <p:sp>
+        <p:nvSpPr>
+          <p:cNvPr id="76" name="TextBox 75">
+            <a:extLst>
+              <a:ext uri="{FF2B5EF4-FFF2-40B4-BE49-F238E27FC236}">
+                <a16:creationId xmlns:a16="http://schemas.microsoft.com/office/drawing/2014/main" id="{A84D51DF-8ACA-4FD5-A753-A9875D143354}"/>
+              </a:ext>
+            </a:extLst>
+          </p:cNvPr>
           <p:cNvSpPr txBox="1"/>
           <p:nvPr/>
         </p:nvSpPr>
         <p:spPr>
           <a:xfrm>
-            <a:off x="961006" y="5383814"/>
-            <a:ext cx="974241" cy="276999"/>
+            <a:off x="3408382" y="3186580"/>
+            <a:ext cx="1060251" cy="276999"/>
           </a:xfrm>
           <a:prstGeom prst="rect">
             <a:avLst/>
@@ -5927,28 +8204,36 @@
           <a:noFill/>
         </p:spPr>
         <p:txBody>
-          <a:bodyPr wrap="none" rtlCol="0">
+          <a:bodyPr wrap="square" rtlCol="0">
             <a:spAutoFit/>
           </a:bodyPr>
           <a:lstStyle/>
           <a:p>
             <a:r>
               <a:rPr lang="en-US" sz="1200" dirty="0"/>
-              <a:t>Pumped GW</a:t>
+              <a:t>GW right</a:t>
             </a:r>
           </a:p>
         </p:txBody>
       </p:sp>
       <p:cxnSp>
         <p:nvCxnSpPr>
-          <p:cNvPr id="51" name="Straight Arrow Connector 50"/>
-          <p:cNvCxnSpPr/>
+          <p:cNvPr id="77" name="Straight Arrow Connector 76">
+            <a:extLst>
+              <a:ext uri="{FF2B5EF4-FFF2-40B4-BE49-F238E27FC236}">
+                <a16:creationId xmlns:a16="http://schemas.microsoft.com/office/drawing/2014/main" id="{897BDBC1-9DB2-4CC6-9A70-4A2878889F50}"/>
+              </a:ext>
+            </a:extLst>
+          </p:cNvPr>
+          <p:cNvCxnSpPr>
+            <a:cxnSpLocks/>
+          </p:cNvCxnSpPr>
           <p:nvPr/>
         </p:nvCxnSpPr>
         <p:spPr>
-          <a:xfrm>
-            <a:off x="3417668" y="1534560"/>
-            <a:ext cx="0" cy="304371"/>
+          <a:xfrm flipV="1">
+            <a:off x="1782147" y="1970941"/>
+            <a:ext cx="968873" cy="5935"/>
           </a:xfrm>
           <a:prstGeom prst="straightConnector1">
             <a:avLst/>
@@ -5957,8 +8242,7 @@
             <a:solidFill>
               <a:schemeClr val="tx1"/>
             </a:solidFill>
-            <a:headEnd type="none" w="med" len="med"/>
-            <a:tailEnd type="triangle" w="med" len="med"/>
+            <a:tailEnd type="triangle"/>
           </a:ln>
         </p:spPr>
         <p:style>
@@ -5976,678 +8260,10 @@
           </a:fontRef>
         </p:style>
       </p:cxnSp>
-      <p:sp>
-        <p:nvSpPr>
-          <p:cNvPr id="3" name="Rectangle 2"/>
-          <p:cNvSpPr/>
-          <p:nvPr/>
-        </p:nvSpPr>
-        <p:spPr>
-          <a:xfrm>
-            <a:off x="2165414" y="1009750"/>
-            <a:ext cx="2551767" cy="523220"/>
-          </a:xfrm>
-          <a:prstGeom prst="rect">
-            <a:avLst/>
-          </a:prstGeom>
-        </p:spPr>
-        <p:txBody>
-          <a:bodyPr wrap="square">
-            <a:spAutoFit/>
-          </a:bodyPr>
-          <a:lstStyle/>
-          <a:p>
-            <a:pPr algn="ctr"/>
-            <a:r>
-              <a:rPr lang="en-US" sz="1400" dirty="0"/>
-              <a:t>Externally (UZF) or internally (PRMS) calculated </a:t>
-            </a:r>
-            <a:r>
-              <a:rPr lang="en-US" sz="1400" dirty="0" err="1"/>
-              <a:t>ET</a:t>
-            </a:r>
-            <a:r>
-              <a:rPr lang="en-US" sz="1400" baseline="-25000" dirty="0" err="1"/>
-              <a:t>d</a:t>
-            </a:r>
-            <a:endParaRPr lang="en-US" sz="1400" baseline="-25000" dirty="0"/>
-          </a:p>
-        </p:txBody>
-      </p:sp>
-      <p:sp>
-        <p:nvSpPr>
-          <p:cNvPr id="52" name="Rectangle 51"/>
-          <p:cNvSpPr/>
-          <p:nvPr/>
-        </p:nvSpPr>
-        <p:spPr>
-          <a:xfrm>
-            <a:off x="2165181" y="992347"/>
-            <a:ext cx="2495871" cy="545144"/>
-          </a:xfrm>
-          <a:prstGeom prst="rect">
-            <a:avLst/>
-          </a:prstGeom>
-          <a:noFill/>
-          <a:ln>
-            <a:solidFill>
-              <a:schemeClr val="tx1"/>
-            </a:solidFill>
-          </a:ln>
-        </p:spPr>
-        <p:style>
-          <a:lnRef idx="2">
-            <a:schemeClr val="accent1">
-              <a:shade val="50000"/>
-            </a:schemeClr>
-          </a:lnRef>
-          <a:fillRef idx="1">
-            <a:schemeClr val="accent1"/>
-          </a:fillRef>
-          <a:effectRef idx="0">
-            <a:schemeClr val="accent1"/>
-          </a:effectRef>
-          <a:fontRef idx="minor">
-            <a:schemeClr val="lt1"/>
-          </a:fontRef>
-        </p:style>
-        <p:txBody>
-          <a:bodyPr rtlCol="0" anchor="ctr"/>
-          <a:lstStyle/>
-          <a:p>
-            <a:pPr algn="ctr"/>
-            <a:endParaRPr lang="en-US"/>
-          </a:p>
-        </p:txBody>
-      </p:sp>
-      <p:sp>
-        <p:nvSpPr>
-          <p:cNvPr id="53" name="TextBox 52"/>
-          <p:cNvSpPr txBox="1"/>
-          <p:nvPr/>
-        </p:nvSpPr>
-        <p:spPr>
-          <a:xfrm>
-            <a:off x="974214" y="4250264"/>
-            <a:ext cx="959430" cy="276999"/>
-          </a:xfrm>
-          <a:prstGeom prst="rect">
-            <a:avLst/>
-          </a:prstGeom>
-          <a:noFill/>
-        </p:spPr>
-        <p:txBody>
-          <a:bodyPr wrap="none" rtlCol="0">
-            <a:spAutoFit/>
-          </a:bodyPr>
-          <a:lstStyle/>
-          <a:p>
-            <a:r>
-              <a:rPr lang="en-US" sz="1200" dirty="0"/>
-              <a:t>Diverted SW</a:t>
-            </a:r>
-          </a:p>
-        </p:txBody>
-      </p:sp>
-      <p:sp>
-        <p:nvSpPr>
-          <p:cNvPr id="56" name="TextBox 55"/>
-          <p:cNvSpPr txBox="1"/>
-          <p:nvPr/>
-        </p:nvSpPr>
-        <p:spPr>
-          <a:xfrm>
-            <a:off x="1455532" y="3011361"/>
-            <a:ext cx="959430" cy="461665"/>
-          </a:xfrm>
-          <a:prstGeom prst="rect">
-            <a:avLst/>
-          </a:prstGeom>
-          <a:noFill/>
-        </p:spPr>
-        <p:txBody>
-          <a:bodyPr wrap="square" rtlCol="0">
-            <a:spAutoFit/>
-          </a:bodyPr>
-          <a:lstStyle/>
-          <a:p>
-            <a:r>
-              <a:rPr lang="en-US" sz="1200" dirty="0"/>
-              <a:t>Nonlinear iterations</a:t>
-            </a:r>
-          </a:p>
-        </p:txBody>
-      </p:sp>
-      <p:cxnSp>
-        <p:nvCxnSpPr>
-          <p:cNvPr id="57" name="Straight Connector 56"/>
-          <p:cNvCxnSpPr>
-            <a:stCxn id="56" idx="0"/>
-          </p:cNvCxnSpPr>
-          <p:nvPr/>
-        </p:nvCxnSpPr>
-        <p:spPr>
-          <a:xfrm flipH="1" flipV="1">
-            <a:off x="1915510" y="2239040"/>
-            <a:ext cx="0" cy="772321"/>
-          </a:xfrm>
-          <a:prstGeom prst="line">
-            <a:avLst/>
-          </a:prstGeom>
-          <a:ln w="19050">
-            <a:solidFill>
-              <a:schemeClr val="tx1"/>
-            </a:solidFill>
-          </a:ln>
-        </p:spPr>
-        <p:style>
-          <a:lnRef idx="1">
-            <a:schemeClr val="accent1"/>
-          </a:lnRef>
-          <a:fillRef idx="0">
-            <a:schemeClr val="accent1"/>
-          </a:fillRef>
-          <a:effectRef idx="0">
-            <a:schemeClr val="accent1"/>
-          </a:effectRef>
-          <a:fontRef idx="minor">
-            <a:schemeClr val="tx1"/>
-          </a:fontRef>
-        </p:style>
-      </p:cxnSp>
-      <p:sp>
-        <p:nvSpPr>
-          <p:cNvPr id="59" name="TextBox 58"/>
-          <p:cNvSpPr txBox="1"/>
-          <p:nvPr/>
-        </p:nvSpPr>
-        <p:spPr>
-          <a:xfrm>
-            <a:off x="4364931" y="2013177"/>
-            <a:ext cx="2397980" cy="523220"/>
-          </a:xfrm>
-          <a:prstGeom prst="rect">
-            <a:avLst/>
-          </a:prstGeom>
-          <a:noFill/>
-        </p:spPr>
-        <p:txBody>
-          <a:bodyPr wrap="square" rtlCol="0">
-            <a:spAutoFit/>
-          </a:bodyPr>
-          <a:lstStyle/>
-          <a:p>
-            <a:pPr algn="ctr"/>
-            <a:r>
-              <a:rPr lang="en-US" sz="1400" dirty="0"/>
-              <a:t>Return flows (SW+GW) calculated by UZF/PRMS</a:t>
-            </a:r>
-          </a:p>
-        </p:txBody>
-      </p:sp>
-      <p:sp>
-        <p:nvSpPr>
-          <p:cNvPr id="60" name="Rectangle 59"/>
-          <p:cNvSpPr/>
-          <p:nvPr/>
-        </p:nvSpPr>
-        <p:spPr>
-          <a:xfrm>
-            <a:off x="4592504" y="1894997"/>
-            <a:ext cx="1931010" cy="715871"/>
-          </a:xfrm>
-          <a:prstGeom prst="rect">
-            <a:avLst/>
-          </a:prstGeom>
-          <a:noFill/>
-          <a:ln>
-            <a:solidFill>
-              <a:schemeClr val="tx1"/>
-            </a:solidFill>
-          </a:ln>
-        </p:spPr>
-        <p:style>
-          <a:lnRef idx="2">
-            <a:schemeClr val="accent1">
-              <a:shade val="50000"/>
-            </a:schemeClr>
-          </a:lnRef>
-          <a:fillRef idx="1">
-            <a:schemeClr val="accent1"/>
-          </a:fillRef>
-          <a:effectRef idx="0">
-            <a:schemeClr val="accent1"/>
-          </a:effectRef>
-          <a:fontRef idx="minor">
-            <a:schemeClr val="lt1"/>
-          </a:fontRef>
-        </p:style>
-        <p:txBody>
-          <a:bodyPr rtlCol="0" anchor="ctr"/>
-          <a:lstStyle/>
-          <a:p>
-            <a:pPr algn="ctr"/>
-            <a:endParaRPr lang="en-US"/>
-          </a:p>
-        </p:txBody>
-      </p:sp>
-      <p:cxnSp>
-        <p:nvCxnSpPr>
-          <p:cNvPr id="61" name="Straight Arrow Connector 60"/>
-          <p:cNvCxnSpPr/>
-          <p:nvPr/>
-        </p:nvCxnSpPr>
-        <p:spPr>
-          <a:xfrm>
-            <a:off x="4307705" y="2239040"/>
-            <a:ext cx="296623" cy="0"/>
-          </a:xfrm>
-          <a:prstGeom prst="straightConnector1">
-            <a:avLst/>
-          </a:prstGeom>
-          <a:ln w="19050">
-            <a:solidFill>
-              <a:schemeClr val="tx1"/>
-            </a:solidFill>
-            <a:tailEnd type="triangle"/>
-          </a:ln>
-        </p:spPr>
-        <p:style>
-          <a:lnRef idx="1">
-            <a:schemeClr val="accent1"/>
-          </a:lnRef>
-          <a:fillRef idx="0">
-            <a:schemeClr val="accent1"/>
-          </a:fillRef>
-          <a:effectRef idx="0">
-            <a:schemeClr val="accent1"/>
-          </a:effectRef>
-          <a:fontRef idx="minor">
-            <a:schemeClr val="tx1"/>
-          </a:fontRef>
-        </p:style>
-      </p:cxnSp>
-      <p:sp>
-        <p:nvSpPr>
-          <p:cNvPr id="63" name="Rectangle 62"/>
-          <p:cNvSpPr/>
-          <p:nvPr/>
-        </p:nvSpPr>
-        <p:spPr>
-          <a:xfrm>
-            <a:off x="5070756" y="2947134"/>
-            <a:ext cx="2659417" cy="725990"/>
-          </a:xfrm>
-          <a:prstGeom prst="rect">
-            <a:avLst/>
-          </a:prstGeom>
-          <a:noFill/>
-          <a:ln>
-            <a:solidFill>
-              <a:schemeClr val="tx1"/>
-            </a:solidFill>
-          </a:ln>
-        </p:spPr>
-        <p:style>
-          <a:lnRef idx="2">
-            <a:schemeClr val="accent1">
-              <a:shade val="50000"/>
-            </a:schemeClr>
-          </a:lnRef>
-          <a:fillRef idx="1">
-            <a:schemeClr val="accent1"/>
-          </a:fillRef>
-          <a:effectRef idx="0">
-            <a:schemeClr val="accent1"/>
-          </a:effectRef>
-          <a:fontRef idx="minor">
-            <a:schemeClr val="lt1"/>
-          </a:fontRef>
-        </p:style>
-        <p:txBody>
-          <a:bodyPr rtlCol="0" anchor="ctr"/>
-          <a:lstStyle/>
-          <a:p>
-            <a:pPr algn="ctr"/>
-            <a:endParaRPr lang="en-US"/>
-          </a:p>
-        </p:txBody>
-      </p:sp>
-      <p:sp>
-        <p:nvSpPr>
-          <p:cNvPr id="64" name="TextBox 63"/>
-          <p:cNvSpPr txBox="1"/>
-          <p:nvPr/>
-        </p:nvSpPr>
-        <p:spPr>
-          <a:xfrm>
-            <a:off x="5045053" y="2949655"/>
-            <a:ext cx="2735317" cy="738664"/>
-          </a:xfrm>
-          <a:prstGeom prst="rect">
-            <a:avLst/>
-          </a:prstGeom>
-          <a:noFill/>
-        </p:spPr>
-        <p:txBody>
-          <a:bodyPr wrap="square" rtlCol="0">
-            <a:spAutoFit/>
-          </a:bodyPr>
-          <a:lstStyle/>
-          <a:p>
-            <a:pPr algn="ctr"/>
-            <a:r>
-              <a:rPr lang="en-US" sz="1400" dirty="0"/>
-              <a:t>GW pumping rate set as Irrigation demand, and limited by AGO input “Q”</a:t>
-            </a:r>
-          </a:p>
-        </p:txBody>
-      </p:sp>
-      <p:sp>
-        <p:nvSpPr>
-          <p:cNvPr id="66" name="Rectangle 65"/>
-          <p:cNvSpPr/>
-          <p:nvPr/>
-        </p:nvSpPr>
-        <p:spPr>
-          <a:xfrm>
-            <a:off x="2323623" y="6125934"/>
-            <a:ext cx="2286000" cy="515716"/>
-          </a:xfrm>
-          <a:prstGeom prst="rect">
-            <a:avLst/>
-          </a:prstGeom>
-          <a:noFill/>
-          <a:ln>
-            <a:solidFill>
-              <a:schemeClr val="tx1"/>
-            </a:solidFill>
-          </a:ln>
-        </p:spPr>
-        <p:style>
-          <a:lnRef idx="2">
-            <a:schemeClr val="accent1">
-              <a:shade val="50000"/>
-            </a:schemeClr>
-          </a:lnRef>
-          <a:fillRef idx="1">
-            <a:schemeClr val="accent1"/>
-          </a:fillRef>
-          <a:effectRef idx="0">
-            <a:schemeClr val="accent1"/>
-          </a:effectRef>
-          <a:fontRef idx="minor">
-            <a:schemeClr val="lt1"/>
-          </a:fontRef>
-        </p:style>
-        <p:txBody>
-          <a:bodyPr rtlCol="0" anchor="ctr"/>
-          <a:lstStyle/>
-          <a:p>
-            <a:pPr algn="ctr"/>
-            <a:endParaRPr lang="en-US"/>
-          </a:p>
-        </p:txBody>
-      </p:sp>
-      <p:sp>
-        <p:nvSpPr>
-          <p:cNvPr id="67" name="TextBox 66"/>
-          <p:cNvSpPr txBox="1"/>
-          <p:nvPr/>
-        </p:nvSpPr>
-        <p:spPr>
-          <a:xfrm>
-            <a:off x="2114003" y="6124729"/>
-            <a:ext cx="2735317" cy="677108"/>
-          </a:xfrm>
-          <a:prstGeom prst="rect">
-            <a:avLst/>
-          </a:prstGeom>
-          <a:noFill/>
-        </p:spPr>
-        <p:txBody>
-          <a:bodyPr wrap="square" rtlCol="0">
-            <a:spAutoFit/>
-          </a:bodyPr>
-          <a:lstStyle/>
-          <a:p>
-            <a:pPr algn="ctr"/>
-            <a:r>
-              <a:rPr lang="en-US" sz="1400" dirty="0"/>
-              <a:t>GW irrigation</a:t>
-            </a:r>
-          </a:p>
-          <a:p>
-            <a:pPr algn="ctr"/>
-            <a:r>
-              <a:rPr lang="en-US" sz="1000" dirty="0"/>
-              <a:t>(IRRIGATIONWELL)</a:t>
-            </a:r>
-          </a:p>
-          <a:p>
-            <a:pPr algn="ctr"/>
-            <a:endParaRPr lang="en-US" sz="1400" dirty="0"/>
-          </a:p>
-        </p:txBody>
-      </p:sp>
-      <p:sp>
-        <p:nvSpPr>
-          <p:cNvPr id="69" name="Rectangle 68"/>
-          <p:cNvSpPr/>
-          <p:nvPr/>
-        </p:nvSpPr>
-        <p:spPr>
-          <a:xfrm>
-            <a:off x="2323623" y="5139593"/>
-            <a:ext cx="2286000" cy="686324"/>
-          </a:xfrm>
-          <a:prstGeom prst="rect">
-            <a:avLst/>
-          </a:prstGeom>
-          <a:noFill/>
-          <a:ln>
-            <a:solidFill>
-              <a:schemeClr val="tx1"/>
-            </a:solidFill>
-          </a:ln>
-        </p:spPr>
-        <p:style>
-          <a:lnRef idx="2">
-            <a:schemeClr val="accent1">
-              <a:shade val="50000"/>
-            </a:schemeClr>
-          </a:lnRef>
-          <a:fillRef idx="1">
-            <a:schemeClr val="accent1"/>
-          </a:fillRef>
-          <a:effectRef idx="0">
-            <a:schemeClr val="accent1"/>
-          </a:effectRef>
-          <a:fontRef idx="minor">
-            <a:schemeClr val="lt1"/>
-          </a:fontRef>
-        </p:style>
-        <p:txBody>
-          <a:bodyPr rtlCol="0" anchor="ctr"/>
-          <a:lstStyle/>
-          <a:p>
-            <a:pPr algn="ctr"/>
-            <a:endParaRPr lang="en-US"/>
-          </a:p>
-        </p:txBody>
-      </p:sp>
-      <p:sp>
-        <p:nvSpPr>
-          <p:cNvPr id="70" name="TextBox 69"/>
-          <p:cNvSpPr txBox="1"/>
-          <p:nvPr/>
-        </p:nvSpPr>
-        <p:spPr>
-          <a:xfrm>
-            <a:off x="2339886" y="5148808"/>
-            <a:ext cx="2300558" cy="677108"/>
-          </a:xfrm>
-          <a:prstGeom prst="rect">
-            <a:avLst/>
-          </a:prstGeom>
-          <a:noFill/>
-        </p:spPr>
-        <p:txBody>
-          <a:bodyPr wrap="square" rtlCol="0">
-            <a:spAutoFit/>
-          </a:bodyPr>
-          <a:lstStyle/>
-          <a:p>
-            <a:pPr algn="ctr"/>
-            <a:r>
-              <a:rPr lang="en-US" sz="1400" dirty="0"/>
-              <a:t>GW Demand set as SW shortfall</a:t>
-            </a:r>
-          </a:p>
-          <a:p>
-            <a:pPr algn="ctr"/>
-            <a:r>
-              <a:rPr lang="en-US" sz="1000" dirty="0"/>
-              <a:t>(SUPPLEMENTALWELL)</a:t>
-            </a:r>
-          </a:p>
-        </p:txBody>
-      </p:sp>
-      <p:cxnSp>
-        <p:nvCxnSpPr>
-          <p:cNvPr id="71" name="Straight Arrow Connector 70"/>
-          <p:cNvCxnSpPr/>
-          <p:nvPr/>
-        </p:nvCxnSpPr>
-        <p:spPr>
-          <a:xfrm>
-            <a:off x="3490165" y="5825916"/>
-            <a:ext cx="0" cy="304371"/>
-          </a:xfrm>
-          <a:prstGeom prst="straightConnector1">
-            <a:avLst/>
-          </a:prstGeom>
-          <a:ln w="19050">
-            <a:solidFill>
-              <a:schemeClr val="tx1"/>
-            </a:solidFill>
-            <a:headEnd type="none" w="med" len="med"/>
-            <a:tailEnd type="triangle" w="med" len="med"/>
-          </a:ln>
-        </p:spPr>
-        <p:style>
-          <a:lnRef idx="1">
-            <a:schemeClr val="accent1"/>
-          </a:lnRef>
-          <a:fillRef idx="0">
-            <a:schemeClr val="accent1"/>
-          </a:fillRef>
-          <a:effectRef idx="0">
-            <a:schemeClr val="accent1"/>
-          </a:effectRef>
-          <a:fontRef idx="minor">
-            <a:schemeClr val="tx1"/>
-          </a:fontRef>
-        </p:style>
-      </p:cxnSp>
-      <p:cxnSp>
-        <p:nvCxnSpPr>
-          <p:cNvPr id="74" name="Straight Arrow Connector 73"/>
-          <p:cNvCxnSpPr/>
-          <p:nvPr/>
-        </p:nvCxnSpPr>
-        <p:spPr>
-          <a:xfrm flipV="1">
-            <a:off x="4531904" y="3318987"/>
-            <a:ext cx="547653" cy="0"/>
-          </a:xfrm>
-          <a:prstGeom prst="straightConnector1">
-            <a:avLst/>
-          </a:prstGeom>
-          <a:ln w="19050">
-            <a:solidFill>
-              <a:schemeClr val="tx1"/>
-            </a:solidFill>
-            <a:tailEnd type="triangle"/>
-          </a:ln>
-        </p:spPr>
-        <p:style>
-          <a:lnRef idx="1">
-            <a:schemeClr val="accent1"/>
-          </a:lnRef>
-          <a:fillRef idx="0">
-            <a:schemeClr val="accent1"/>
-          </a:fillRef>
-          <a:effectRef idx="0">
-            <a:schemeClr val="accent1"/>
-          </a:effectRef>
-          <a:fontRef idx="minor">
-            <a:schemeClr val="tx1"/>
-          </a:fontRef>
-        </p:style>
-      </p:cxnSp>
-      <p:sp>
-        <p:nvSpPr>
-          <p:cNvPr id="75" name="TextBox 74"/>
-          <p:cNvSpPr txBox="1"/>
-          <p:nvPr/>
-        </p:nvSpPr>
-        <p:spPr>
-          <a:xfrm>
-            <a:off x="4488970" y="3002777"/>
-            <a:ext cx="1098721" cy="276999"/>
-          </a:xfrm>
-          <a:prstGeom prst="rect">
-            <a:avLst/>
-          </a:prstGeom>
-          <a:noFill/>
-        </p:spPr>
-        <p:txBody>
-          <a:bodyPr wrap="square" rtlCol="0">
-            <a:spAutoFit/>
-          </a:bodyPr>
-          <a:lstStyle/>
-          <a:p>
-            <a:r>
-              <a:rPr lang="en-US" sz="1200" dirty="0"/>
-              <a:t>No SW</a:t>
-            </a:r>
-          </a:p>
-        </p:txBody>
-      </p:sp>
-      <p:sp>
-        <p:nvSpPr>
-          <p:cNvPr id="43" name="TextBox 42"/>
-          <p:cNvSpPr txBox="1"/>
-          <p:nvPr/>
-        </p:nvSpPr>
-        <p:spPr>
-          <a:xfrm>
-            <a:off x="4575439" y="3329944"/>
-            <a:ext cx="626658" cy="461665"/>
-          </a:xfrm>
-          <a:prstGeom prst="rect">
-            <a:avLst/>
-          </a:prstGeom>
-          <a:noFill/>
-        </p:spPr>
-        <p:txBody>
-          <a:bodyPr wrap="square" rtlCol="0">
-            <a:spAutoFit/>
-          </a:bodyPr>
-          <a:lstStyle/>
-          <a:p>
-            <a:r>
-              <a:rPr lang="en-US" sz="1200" dirty="0"/>
-              <a:t>GW right</a:t>
-            </a:r>
-          </a:p>
-        </p:txBody>
-      </p:sp>
     </p:spTree>
     <p:extLst>
       <p:ext uri="{BB962C8B-B14F-4D97-AF65-F5344CB8AC3E}">
-        <p14:creationId xmlns:p14="http://schemas.microsoft.com/office/powerpoint/2010/main" val="1970704118"/>
+        <p14:creationId xmlns:p14="http://schemas.microsoft.com/office/powerpoint/2010/main" val="1312281491"/>
       </p:ext>
     </p:extLst>
   </p:cSld>

</xml_diff>